<commit_message>
Update of "Analyzing Data" module for UI changes
</commit_message>
<xml_diff>
--- a/learn-bizapps-pr/power-bi/analyze-data-power-bi/media-layered/power-bi-consumer-source.pptx
+++ b/learn-bizapps-pr/power-bi/analyze-data-power-bi/media-layered/power-bi-consumer-source.pptx
@@ -11,6 +11,9 @@
     <p:sldId id="267" r:id="rId5"/>
     <p:sldId id="256" r:id="rId6"/>
     <p:sldId id="281" r:id="rId7"/>
+    <p:sldId id="282" r:id="rId8"/>
+    <p:sldId id="283" r:id="rId9"/>
+    <p:sldId id="284" r:id="rId10"/>
   </p:sldIdLst>
   <p:sldSz cx="12192000" cy="6858000"/>
   <p:notesSz cx="6858000" cy="9144000"/>
@@ -264,7 +267,7 @@
           <a:p>
             <a:fld id="{AE8F84D6-6E9A-4250-9F52-88EEFA933E23}" type="datetimeFigureOut">
               <a:rPr lang="en-US" smtClean="0"/>
-              <a:t>12/30/2019</a:t>
+              <a:t>12/31/2019</a:t>
             </a:fld>
             <a:endParaRPr lang="en-US"/>
           </a:p>
@@ -462,7 +465,7 @@
           <a:p>
             <a:fld id="{AE8F84D6-6E9A-4250-9F52-88EEFA933E23}" type="datetimeFigureOut">
               <a:rPr lang="en-US" smtClean="0"/>
-              <a:t>12/30/2019</a:t>
+              <a:t>12/31/2019</a:t>
             </a:fld>
             <a:endParaRPr lang="en-US"/>
           </a:p>
@@ -670,7 +673,7 @@
           <a:p>
             <a:fld id="{AE8F84D6-6E9A-4250-9F52-88EEFA933E23}" type="datetimeFigureOut">
               <a:rPr lang="en-US" smtClean="0"/>
-              <a:t>12/30/2019</a:t>
+              <a:t>12/31/2019</a:t>
             </a:fld>
             <a:endParaRPr lang="en-US"/>
           </a:p>
@@ -868,7 +871,7 @@
           <a:p>
             <a:fld id="{AE8F84D6-6E9A-4250-9F52-88EEFA933E23}" type="datetimeFigureOut">
               <a:rPr lang="en-US" smtClean="0"/>
-              <a:t>12/30/2019</a:t>
+              <a:t>12/31/2019</a:t>
             </a:fld>
             <a:endParaRPr lang="en-US"/>
           </a:p>
@@ -1143,7 +1146,7 @@
           <a:p>
             <a:fld id="{AE8F84D6-6E9A-4250-9F52-88EEFA933E23}" type="datetimeFigureOut">
               <a:rPr lang="en-US" smtClean="0"/>
-              <a:t>12/30/2019</a:t>
+              <a:t>12/31/2019</a:t>
             </a:fld>
             <a:endParaRPr lang="en-US"/>
           </a:p>
@@ -1408,7 +1411,7 @@
           <a:p>
             <a:fld id="{AE8F84D6-6E9A-4250-9F52-88EEFA933E23}" type="datetimeFigureOut">
               <a:rPr lang="en-US" smtClean="0"/>
-              <a:t>12/30/2019</a:t>
+              <a:t>12/31/2019</a:t>
             </a:fld>
             <a:endParaRPr lang="en-US"/>
           </a:p>
@@ -1820,7 +1823,7 @@
           <a:p>
             <a:fld id="{AE8F84D6-6E9A-4250-9F52-88EEFA933E23}" type="datetimeFigureOut">
               <a:rPr lang="en-US" smtClean="0"/>
-              <a:t>12/30/2019</a:t>
+              <a:t>12/31/2019</a:t>
             </a:fld>
             <a:endParaRPr lang="en-US"/>
           </a:p>
@@ -1961,7 +1964,7 @@
           <a:p>
             <a:fld id="{AE8F84D6-6E9A-4250-9F52-88EEFA933E23}" type="datetimeFigureOut">
               <a:rPr lang="en-US" smtClean="0"/>
-              <a:t>12/30/2019</a:t>
+              <a:t>12/31/2019</a:t>
             </a:fld>
             <a:endParaRPr lang="en-US"/>
           </a:p>
@@ -2074,7 +2077,7 @@
           <a:p>
             <a:fld id="{AE8F84D6-6E9A-4250-9F52-88EEFA933E23}" type="datetimeFigureOut">
               <a:rPr lang="en-US" smtClean="0"/>
-              <a:t>12/30/2019</a:t>
+              <a:t>12/31/2019</a:t>
             </a:fld>
             <a:endParaRPr lang="en-US"/>
           </a:p>
@@ -2385,7 +2388,7 @@
           <a:p>
             <a:fld id="{AE8F84D6-6E9A-4250-9F52-88EEFA933E23}" type="datetimeFigureOut">
               <a:rPr lang="en-US" smtClean="0"/>
-              <a:t>12/30/2019</a:t>
+              <a:t>12/31/2019</a:t>
             </a:fld>
             <a:endParaRPr lang="en-US"/>
           </a:p>
@@ -2673,7 +2676,7 @@
           <a:p>
             <a:fld id="{AE8F84D6-6E9A-4250-9F52-88EEFA933E23}" type="datetimeFigureOut">
               <a:rPr lang="en-US" smtClean="0"/>
-              <a:t>12/30/2019</a:t>
+              <a:t>12/31/2019</a:t>
             </a:fld>
             <a:endParaRPr lang="en-US"/>
           </a:p>
@@ -2914,7 +2917,7 @@
           <a:p>
             <a:fld id="{AE8F84D6-6E9A-4250-9F52-88EEFA933E23}" type="datetimeFigureOut">
               <a:rPr lang="en-US" smtClean="0"/>
-              <a:t>12/30/2019</a:t>
+              <a:t>12/31/2019</a:t>
             </a:fld>
             <a:endParaRPr lang="en-US"/>
           </a:p>
@@ -10777,7 +10780,7 @@
         </p:blipFill>
         <p:spPr>
           <a:xfrm>
-            <a:off x="5121035" y="251817"/>
+            <a:off x="5121035" y="39157"/>
             <a:ext cx="4171950" cy="809625"/>
           </a:xfrm>
           <a:prstGeom prst="rect">
@@ -10799,7 +10802,7 @@
         </p:nvSpPr>
         <p:spPr>
           <a:xfrm>
-            <a:off x="5973350" y="745771"/>
+            <a:off x="5973350" y="533111"/>
             <a:ext cx="1426910" cy="315672"/>
           </a:xfrm>
           <a:prstGeom prst="rect">
@@ -10866,7 +10869,7 @@
         </p:blipFill>
         <p:spPr>
           <a:xfrm>
-            <a:off x="5177742" y="1376217"/>
+            <a:off x="5177742" y="1163557"/>
             <a:ext cx="1838582" cy="2476846"/>
           </a:xfrm>
           <a:prstGeom prst="rect">
@@ -10895,8 +10898,549 @@
         </p:blipFill>
         <p:spPr>
           <a:xfrm>
-            <a:off x="7400261" y="1479823"/>
+            <a:off x="9485735" y="112774"/>
             <a:ext cx="1815177" cy="2962688"/>
+          </a:xfrm>
+          <a:prstGeom prst="rect">
+            <a:avLst/>
+          </a:prstGeom>
+        </p:spPr>
+      </p:pic>
+      <p:pic>
+        <p:nvPicPr>
+          <p:cNvPr id="3" name="Picture 2">
+            <a:extLst>
+              <a:ext uri="{FF2B5EF4-FFF2-40B4-BE49-F238E27FC236}">
+                <a16:creationId xmlns:a16="http://schemas.microsoft.com/office/drawing/2014/main" id="{771ADDED-280A-4A37-BF54-656227C5FCE5}"/>
+              </a:ext>
+            </a:extLst>
+          </p:cNvPr>
+          <p:cNvPicPr>
+            <a:picLocks noChangeAspect="1"/>
+          </p:cNvPicPr>
+          <p:nvPr/>
+        </p:nvPicPr>
+        <p:blipFill>
+          <a:blip r:embed="rId6"/>
+          <a:stretch>
+            <a:fillRect/>
+          </a:stretch>
+        </p:blipFill>
+        <p:spPr>
+          <a:xfrm>
+            <a:off x="295564" y="4853564"/>
+            <a:ext cx="3533775" cy="857250"/>
+          </a:xfrm>
+          <a:prstGeom prst="rect">
+            <a:avLst/>
+          </a:prstGeom>
+          <a:noFill/>
+          <a:ln>
+            <a:solidFill>
+              <a:srgbClr val="C3C3C3"/>
+            </a:solidFill>
+          </a:ln>
+        </p:spPr>
+      </p:pic>
+      <p:sp>
+        <p:nvSpPr>
+          <p:cNvPr id="15" name="Rectangle 14">
+            <a:extLst>
+              <a:ext uri="{FF2B5EF4-FFF2-40B4-BE49-F238E27FC236}">
+                <a16:creationId xmlns:a16="http://schemas.microsoft.com/office/drawing/2014/main" id="{65311E0C-6A24-4942-A01B-95D16EA3F36D}"/>
+              </a:ext>
+            </a:extLst>
+          </p:cNvPr>
+          <p:cNvSpPr/>
+          <p:nvPr/>
+        </p:nvSpPr>
+        <p:spPr>
+          <a:xfrm>
+            <a:off x="1879046" y="5363008"/>
+            <a:ext cx="1269471" cy="310861"/>
+          </a:xfrm>
+          <a:prstGeom prst="rect">
+            <a:avLst/>
+          </a:prstGeom>
+          <a:noFill/>
+          <a:ln w="38100">
+            <a:solidFill>
+              <a:srgbClr val="EF1B36"/>
+            </a:solidFill>
+            <a:headEnd type="none" w="med" len="med"/>
+            <a:tailEnd type="triangle" w="med" len="med"/>
+          </a:ln>
+        </p:spPr>
+        <p:style>
+          <a:lnRef idx="2">
+            <a:schemeClr val="accent1">
+              <a:shade val="50000"/>
+            </a:schemeClr>
+          </a:lnRef>
+          <a:fillRef idx="1">
+            <a:schemeClr val="accent1"/>
+          </a:fillRef>
+          <a:effectRef idx="0">
+            <a:schemeClr val="accent1"/>
+          </a:effectRef>
+          <a:fontRef idx="minor">
+            <a:schemeClr val="lt1"/>
+          </a:fontRef>
+        </p:style>
+        <p:txBody>
+          <a:bodyPr rot="0" spcFirstLastPara="0" vertOverflow="overflow" horzOverflow="overflow" vert="horz" wrap="square" lIns="91440" tIns="45720" rIns="91440" bIns="45720" numCol="1" spcCol="0" rtlCol="0" fromWordArt="0" anchor="ctr" anchorCtr="0" forceAA="0" compatLnSpc="1">
+            <a:prstTxWarp prst="textNoShape">
+              <a:avLst/>
+            </a:prstTxWarp>
+            <a:noAutofit/>
+          </a:bodyPr>
+          <a:lstStyle/>
+          <a:p>
+            <a:pPr algn="ctr"/>
+            <a:endParaRPr lang="en-US"/>
+          </a:p>
+        </p:txBody>
+      </p:sp>
+      <p:pic>
+        <p:nvPicPr>
+          <p:cNvPr id="12" name="Picture 11">
+            <a:extLst>
+              <a:ext uri="{FF2B5EF4-FFF2-40B4-BE49-F238E27FC236}">
+                <a16:creationId xmlns:a16="http://schemas.microsoft.com/office/drawing/2014/main" id="{95DE33AD-EE3F-4BC3-B4DE-9F1638D06264}"/>
+              </a:ext>
+            </a:extLst>
+          </p:cNvPr>
+          <p:cNvPicPr>
+            <a:picLocks noChangeAspect="1"/>
+          </p:cNvPicPr>
+          <p:nvPr/>
+        </p:nvPicPr>
+        <p:blipFill>
+          <a:blip r:embed="rId7"/>
+          <a:stretch>
+            <a:fillRect/>
+          </a:stretch>
+        </p:blipFill>
+        <p:spPr>
+          <a:xfrm>
+            <a:off x="7207010" y="3569416"/>
+            <a:ext cx="3439005" cy="2238687"/>
+          </a:xfrm>
+          <a:prstGeom prst="rect">
+            <a:avLst/>
+          </a:prstGeom>
+        </p:spPr>
+      </p:pic>
+      <p:sp>
+        <p:nvSpPr>
+          <p:cNvPr id="16" name="Rectangle 15">
+            <a:extLst>
+              <a:ext uri="{FF2B5EF4-FFF2-40B4-BE49-F238E27FC236}">
+                <a16:creationId xmlns:a16="http://schemas.microsoft.com/office/drawing/2014/main" id="{D9F3BB7E-CE8D-4A68-A8E2-AEE23F7B1D0B}"/>
+              </a:ext>
+            </a:extLst>
+          </p:cNvPr>
+          <p:cNvSpPr/>
+          <p:nvPr/>
+        </p:nvSpPr>
+        <p:spPr>
+          <a:xfrm>
+            <a:off x="7683668" y="5032207"/>
+            <a:ext cx="2243470" cy="340241"/>
+          </a:xfrm>
+          <a:prstGeom prst="rect">
+            <a:avLst/>
+          </a:prstGeom>
+          <a:noFill/>
+          <a:ln w="38100">
+            <a:solidFill>
+              <a:srgbClr val="EF1B36"/>
+            </a:solidFill>
+            <a:headEnd type="none" w="med" len="med"/>
+            <a:tailEnd type="triangle" w="med" len="med"/>
+          </a:ln>
+        </p:spPr>
+        <p:style>
+          <a:lnRef idx="2">
+            <a:schemeClr val="accent1">
+              <a:shade val="50000"/>
+            </a:schemeClr>
+          </a:lnRef>
+          <a:fillRef idx="1">
+            <a:schemeClr val="accent1"/>
+          </a:fillRef>
+          <a:effectRef idx="0">
+            <a:schemeClr val="accent1"/>
+          </a:effectRef>
+          <a:fontRef idx="minor">
+            <a:schemeClr val="lt1"/>
+          </a:fontRef>
+        </p:style>
+        <p:txBody>
+          <a:bodyPr rot="0" spcFirstLastPara="0" vertOverflow="overflow" horzOverflow="overflow" vert="horz" wrap="square" lIns="91440" tIns="45720" rIns="91440" bIns="45720" numCol="1" spcCol="0" rtlCol="0" fromWordArt="0" anchor="ctr" anchorCtr="0" forceAA="0" compatLnSpc="1">
+            <a:prstTxWarp prst="textNoShape">
+              <a:avLst/>
+            </a:prstTxWarp>
+            <a:noAutofit/>
+          </a:bodyPr>
+          <a:lstStyle/>
+          <a:p>
+            <a:pPr algn="ctr"/>
+            <a:endParaRPr lang="en-US"/>
+          </a:p>
+        </p:txBody>
+      </p:sp>
+      <p:sp>
+        <p:nvSpPr>
+          <p:cNvPr id="17" name="Rectangle 16">
+            <a:extLst>
+              <a:ext uri="{FF2B5EF4-FFF2-40B4-BE49-F238E27FC236}">
+                <a16:creationId xmlns:a16="http://schemas.microsoft.com/office/drawing/2014/main" id="{8EDBC534-3C9A-459B-A2B6-D0D12CB62E77}"/>
+              </a:ext>
+            </a:extLst>
+          </p:cNvPr>
+          <p:cNvSpPr/>
+          <p:nvPr/>
+        </p:nvSpPr>
+        <p:spPr>
+          <a:xfrm>
+            <a:off x="8718245" y="4083438"/>
+            <a:ext cx="1269471" cy="310861"/>
+          </a:xfrm>
+          <a:prstGeom prst="rect">
+            <a:avLst/>
+          </a:prstGeom>
+          <a:noFill/>
+          <a:ln w="38100">
+            <a:solidFill>
+              <a:srgbClr val="EF1B36"/>
+            </a:solidFill>
+            <a:headEnd type="none" w="med" len="med"/>
+            <a:tailEnd type="triangle" w="med" len="med"/>
+          </a:ln>
+        </p:spPr>
+        <p:style>
+          <a:lnRef idx="2">
+            <a:schemeClr val="accent1">
+              <a:shade val="50000"/>
+            </a:schemeClr>
+          </a:lnRef>
+          <a:fillRef idx="1">
+            <a:schemeClr val="accent1"/>
+          </a:fillRef>
+          <a:effectRef idx="0">
+            <a:schemeClr val="accent1"/>
+          </a:effectRef>
+          <a:fontRef idx="minor">
+            <a:schemeClr val="lt1"/>
+          </a:fontRef>
+        </p:style>
+        <p:txBody>
+          <a:bodyPr rot="0" spcFirstLastPara="0" vertOverflow="overflow" horzOverflow="overflow" vert="horz" wrap="square" lIns="91440" tIns="45720" rIns="91440" bIns="45720" numCol="1" spcCol="0" rtlCol="0" fromWordArt="0" anchor="ctr" anchorCtr="0" forceAA="0" compatLnSpc="1">
+            <a:prstTxWarp prst="textNoShape">
+              <a:avLst/>
+            </a:prstTxWarp>
+            <a:noAutofit/>
+          </a:bodyPr>
+          <a:lstStyle/>
+          <a:p>
+            <a:pPr algn="ctr"/>
+            <a:endParaRPr lang="en-US"/>
+          </a:p>
+        </p:txBody>
+      </p:sp>
+      <p:pic>
+        <p:nvPicPr>
+          <p:cNvPr id="18" name="Picture 17">
+            <a:extLst>
+              <a:ext uri="{FF2B5EF4-FFF2-40B4-BE49-F238E27FC236}">
+                <a16:creationId xmlns:a16="http://schemas.microsoft.com/office/drawing/2014/main" id="{4210C11F-1962-479E-8475-F762860D37B4}"/>
+              </a:ext>
+            </a:extLst>
+          </p:cNvPr>
+          <p:cNvPicPr>
+            <a:picLocks noChangeAspect="1"/>
+          </p:cNvPicPr>
+          <p:nvPr/>
+        </p:nvPicPr>
+        <p:blipFill rotWithShape="1">
+          <a:blip r:embed="rId8"/>
+          <a:srcRect l="17933" t="33004" r="19048" b="2267"/>
+          <a:stretch/>
+        </p:blipFill>
+        <p:spPr>
+          <a:xfrm>
+            <a:off x="10883048" y="4075345"/>
+            <a:ext cx="2293282" cy="1732758"/>
+          </a:xfrm>
+          <a:prstGeom prst="rect">
+            <a:avLst/>
+          </a:prstGeom>
+          <a:noFill/>
+          <a:ln>
+            <a:solidFill>
+              <a:srgbClr val="C3C3C3"/>
+            </a:solidFill>
+          </a:ln>
+        </p:spPr>
+      </p:pic>
+      <p:sp>
+        <p:nvSpPr>
+          <p:cNvPr id="19" name="Freeform: Shape 18">
+            <a:extLst>
+              <a:ext uri="{FF2B5EF4-FFF2-40B4-BE49-F238E27FC236}">
+                <a16:creationId xmlns:a16="http://schemas.microsoft.com/office/drawing/2014/main" id="{296C49F6-B7D7-4FE4-B41F-841DC24ECF29}"/>
+              </a:ext>
+            </a:extLst>
+          </p:cNvPr>
+          <p:cNvSpPr/>
+          <p:nvPr/>
+        </p:nvSpPr>
+        <p:spPr>
+          <a:xfrm>
+            <a:off x="10012198" y="4790747"/>
+            <a:ext cx="786810" cy="314703"/>
+          </a:xfrm>
+          <a:custGeom>
+            <a:avLst/>
+            <a:gdLst>
+              <a:gd name="connsiteX0" fmla="*/ 0 w 786810"/>
+              <a:gd name="connsiteY0" fmla="*/ 314703 h 314703"/>
+              <a:gd name="connsiteX1" fmla="*/ 276447 w 786810"/>
+              <a:gd name="connsiteY1" fmla="*/ 27624 h 314703"/>
+              <a:gd name="connsiteX2" fmla="*/ 786810 w 786810"/>
+              <a:gd name="connsiteY2" fmla="*/ 27624 h 314703"/>
+            </a:gdLst>
+            <a:ahLst/>
+            <a:cxnLst>
+              <a:cxn ang="0">
+                <a:pos x="connsiteX0" y="connsiteY0"/>
+              </a:cxn>
+              <a:cxn ang="0">
+                <a:pos x="connsiteX1" y="connsiteY1"/>
+              </a:cxn>
+              <a:cxn ang="0">
+                <a:pos x="connsiteX2" y="connsiteY2"/>
+              </a:cxn>
+            </a:cxnLst>
+            <a:rect l="l" t="t" r="r" b="b"/>
+            <a:pathLst>
+              <a:path w="786810" h="314703">
+                <a:moveTo>
+                  <a:pt x="0" y="314703"/>
+                </a:moveTo>
+                <a:cubicBezTo>
+                  <a:pt x="72656" y="195086"/>
+                  <a:pt x="145312" y="75470"/>
+                  <a:pt x="276447" y="27624"/>
+                </a:cubicBezTo>
+                <a:cubicBezTo>
+                  <a:pt x="407582" y="-20223"/>
+                  <a:pt x="597196" y="3700"/>
+                  <a:pt x="786810" y="27624"/>
+                </a:cubicBezTo>
+              </a:path>
+            </a:pathLst>
+          </a:custGeom>
+          <a:noFill/>
+          <a:ln w="38100">
+            <a:solidFill>
+              <a:srgbClr val="EF1B36"/>
+            </a:solidFill>
+            <a:headEnd type="none" w="med" len="med"/>
+            <a:tailEnd type="triangle" w="med" len="med"/>
+          </a:ln>
+        </p:spPr>
+        <p:style>
+          <a:lnRef idx="2">
+            <a:schemeClr val="accent1">
+              <a:shade val="50000"/>
+            </a:schemeClr>
+          </a:lnRef>
+          <a:fillRef idx="1">
+            <a:schemeClr val="accent1"/>
+          </a:fillRef>
+          <a:effectRef idx="0">
+            <a:schemeClr val="accent1"/>
+          </a:effectRef>
+          <a:fontRef idx="minor">
+            <a:schemeClr val="lt1"/>
+          </a:fontRef>
+        </p:style>
+        <p:txBody>
+          <a:bodyPr rtlCol="0" anchor="ctr"/>
+          <a:lstStyle/>
+          <a:p>
+            <a:pPr algn="ctr"/>
+            <a:endParaRPr lang="en-US"/>
+          </a:p>
+        </p:txBody>
+      </p:sp>
+      <p:sp>
+        <p:nvSpPr>
+          <p:cNvPr id="20" name="Rectangle 19">
+            <a:extLst>
+              <a:ext uri="{FF2B5EF4-FFF2-40B4-BE49-F238E27FC236}">
+                <a16:creationId xmlns:a16="http://schemas.microsoft.com/office/drawing/2014/main" id="{D5734622-77FE-4480-89AC-B2D2E98A78BC}"/>
+              </a:ext>
+            </a:extLst>
+          </p:cNvPr>
+          <p:cNvSpPr/>
+          <p:nvPr/>
+        </p:nvSpPr>
+        <p:spPr>
+          <a:xfrm>
+            <a:off x="7134549" y="3542819"/>
+            <a:ext cx="6131212" cy="2349440"/>
+          </a:xfrm>
+          <a:prstGeom prst="rect">
+            <a:avLst/>
+          </a:prstGeom>
+          <a:noFill/>
+          <a:ln>
+            <a:solidFill>
+              <a:srgbClr val="C3C3C3"/>
+            </a:solidFill>
+          </a:ln>
+        </p:spPr>
+        <p:style>
+          <a:lnRef idx="2">
+            <a:schemeClr val="accent1">
+              <a:shade val="50000"/>
+            </a:schemeClr>
+          </a:lnRef>
+          <a:fillRef idx="1">
+            <a:schemeClr val="accent1"/>
+          </a:fillRef>
+          <a:effectRef idx="0">
+            <a:schemeClr val="accent1"/>
+          </a:effectRef>
+          <a:fontRef idx="minor">
+            <a:schemeClr val="lt1"/>
+          </a:fontRef>
+        </p:style>
+        <p:txBody>
+          <a:bodyPr rtlCol="0" anchor="ctr"/>
+          <a:lstStyle/>
+          <a:p>
+            <a:pPr algn="ctr"/>
+            <a:endParaRPr lang="en-US" dirty="0"/>
+          </a:p>
+        </p:txBody>
+      </p:sp>
+      <p:pic>
+        <p:nvPicPr>
+          <p:cNvPr id="21" name="Picture 20">
+            <a:extLst>
+              <a:ext uri="{FF2B5EF4-FFF2-40B4-BE49-F238E27FC236}">
+                <a16:creationId xmlns:a16="http://schemas.microsoft.com/office/drawing/2014/main" id="{A5D4F020-1F27-4DB1-9290-2C359B8A315D}"/>
+              </a:ext>
+            </a:extLst>
+          </p:cNvPr>
+          <p:cNvPicPr>
+            <a:picLocks noChangeAspect="1"/>
+          </p:cNvPicPr>
+          <p:nvPr/>
+        </p:nvPicPr>
+        <p:blipFill>
+          <a:blip r:embed="rId9"/>
+          <a:stretch>
+            <a:fillRect/>
+          </a:stretch>
+        </p:blipFill>
+        <p:spPr>
+          <a:xfrm>
+            <a:off x="790007" y="5981474"/>
+            <a:ext cx="5896798" cy="800212"/>
+          </a:xfrm>
+          <a:prstGeom prst="rect">
+            <a:avLst/>
+          </a:prstGeom>
+        </p:spPr>
+      </p:pic>
+      <p:sp>
+        <p:nvSpPr>
+          <p:cNvPr id="22" name="Rectangle 21">
+            <a:extLst>
+              <a:ext uri="{FF2B5EF4-FFF2-40B4-BE49-F238E27FC236}">
+                <a16:creationId xmlns:a16="http://schemas.microsoft.com/office/drawing/2014/main" id="{06CA749F-C5D9-41CE-A294-6605156C3F42}"/>
+              </a:ext>
+            </a:extLst>
+          </p:cNvPr>
+          <p:cNvSpPr/>
+          <p:nvPr/>
+        </p:nvSpPr>
+        <p:spPr>
+          <a:xfrm>
+            <a:off x="4703879" y="6062165"/>
+            <a:ext cx="1569330" cy="310861"/>
+          </a:xfrm>
+          <a:prstGeom prst="rect">
+            <a:avLst/>
+          </a:prstGeom>
+          <a:noFill/>
+          <a:ln w="38100">
+            <a:solidFill>
+              <a:srgbClr val="EF1B36"/>
+            </a:solidFill>
+            <a:headEnd type="none" w="med" len="med"/>
+            <a:tailEnd type="triangle" w="med" len="med"/>
+          </a:ln>
+        </p:spPr>
+        <p:style>
+          <a:lnRef idx="2">
+            <a:schemeClr val="accent1">
+              <a:shade val="50000"/>
+            </a:schemeClr>
+          </a:lnRef>
+          <a:fillRef idx="1">
+            <a:schemeClr val="accent1"/>
+          </a:fillRef>
+          <a:effectRef idx="0">
+            <a:schemeClr val="accent1"/>
+          </a:effectRef>
+          <a:fontRef idx="minor">
+            <a:schemeClr val="lt1"/>
+          </a:fontRef>
+        </p:style>
+        <p:txBody>
+          <a:bodyPr rot="0" spcFirstLastPara="0" vertOverflow="overflow" horzOverflow="overflow" vert="horz" wrap="square" lIns="91440" tIns="45720" rIns="91440" bIns="45720" numCol="1" spcCol="0" rtlCol="0" fromWordArt="0" anchor="ctr" anchorCtr="0" forceAA="0" compatLnSpc="1">
+            <a:prstTxWarp prst="textNoShape">
+              <a:avLst/>
+            </a:prstTxWarp>
+            <a:noAutofit/>
+          </a:bodyPr>
+          <a:lstStyle/>
+          <a:p>
+            <a:pPr algn="ctr"/>
+            <a:endParaRPr lang="en-US"/>
+          </a:p>
+        </p:txBody>
+      </p:sp>
+      <p:pic>
+        <p:nvPicPr>
+          <p:cNvPr id="23" name="Picture 22">
+            <a:extLst>
+              <a:ext uri="{FF2B5EF4-FFF2-40B4-BE49-F238E27FC236}">
+                <a16:creationId xmlns:a16="http://schemas.microsoft.com/office/drawing/2014/main" id="{4312114B-311C-412F-850A-AA525E503836}"/>
+              </a:ext>
+            </a:extLst>
+          </p:cNvPr>
+          <p:cNvPicPr>
+            <a:picLocks noChangeAspect="1"/>
+          </p:cNvPicPr>
+          <p:nvPr/>
+        </p:nvPicPr>
+        <p:blipFill>
+          <a:blip r:embed="rId10"/>
+          <a:stretch>
+            <a:fillRect/>
+          </a:stretch>
+        </p:blipFill>
+        <p:spPr>
+          <a:xfrm>
+            <a:off x="11567460" y="726338"/>
+            <a:ext cx="1848108" cy="2514951"/>
           </a:xfrm>
           <a:prstGeom prst="rect">
             <a:avLst/>
@@ -10907,6 +11451,1373 @@
     <p:extLst>
       <p:ext uri="{BB962C8B-B14F-4D97-AF65-F5344CB8AC3E}">
         <p14:creationId xmlns:p14="http://schemas.microsoft.com/office/powerpoint/2010/main" val="1187543784"/>
+      </p:ext>
+    </p:extLst>
+  </p:cSld>
+  <p:clrMapOvr>
+    <a:masterClrMapping/>
+  </p:clrMapOvr>
+</p:sld>
+</file>
+
+<file path=ppt/slides/slide7.xml><?xml version="1.0" encoding="utf-8"?>
+<p:sld xmlns:a="http://schemas.openxmlformats.org/drawingml/2006/main" xmlns:r="http://schemas.openxmlformats.org/officeDocument/2006/relationships" xmlns:p="http://schemas.openxmlformats.org/presentationml/2006/main">
+  <p:cSld>
+    <p:spTree>
+      <p:nvGrpSpPr>
+        <p:cNvPr id="1" name=""/>
+        <p:cNvGrpSpPr/>
+        <p:nvPr/>
+      </p:nvGrpSpPr>
+      <p:grpSpPr>
+        <a:xfrm>
+          <a:off x="0" y="0"/>
+          <a:ext cx="0" cy="0"/>
+          <a:chOff x="0" y="0"/>
+          <a:chExt cx="0" cy="0"/>
+        </a:xfrm>
+      </p:grpSpPr>
+      <p:sp>
+        <p:nvSpPr>
+          <p:cNvPr id="4" name="TextBox 3">
+            <a:extLst>
+              <a:ext uri="{FF2B5EF4-FFF2-40B4-BE49-F238E27FC236}">
+                <a16:creationId xmlns:a16="http://schemas.microsoft.com/office/drawing/2014/main" id="{1902A060-3F5D-498A-8030-6D72EF7E49CC}"/>
+              </a:ext>
+            </a:extLst>
+          </p:cNvPr>
+          <p:cNvSpPr txBox="1"/>
+          <p:nvPr/>
+        </p:nvSpPr>
+        <p:spPr>
+          <a:xfrm>
+            <a:off x="295564" y="323273"/>
+            <a:ext cx="489236" cy="369332"/>
+          </a:xfrm>
+          <a:prstGeom prst="rect">
+            <a:avLst/>
+          </a:prstGeom>
+          <a:noFill/>
+        </p:spPr>
+        <p:txBody>
+          <a:bodyPr wrap="none" rtlCol="0">
+            <a:spAutoFit/>
+          </a:bodyPr>
+          <a:lstStyle/>
+          <a:p>
+            <a:r>
+              <a:rPr lang="en-US" dirty="0"/>
+              <a:t>2-2</a:t>
+            </a:r>
+          </a:p>
+        </p:txBody>
+      </p:sp>
+      <p:sp>
+        <p:nvSpPr>
+          <p:cNvPr id="5" name="Rectangle 4">
+            <a:extLst>
+              <a:ext uri="{FF2B5EF4-FFF2-40B4-BE49-F238E27FC236}">
+                <a16:creationId xmlns:a16="http://schemas.microsoft.com/office/drawing/2014/main" id="{E630D68F-326E-4783-9693-D14B7A345BF1}"/>
+              </a:ext>
+            </a:extLst>
+          </p:cNvPr>
+          <p:cNvSpPr/>
+          <p:nvPr/>
+        </p:nvSpPr>
+        <p:spPr>
+          <a:xfrm>
+            <a:off x="295564" y="849745"/>
+            <a:ext cx="674254" cy="369332"/>
+          </a:xfrm>
+          <a:prstGeom prst="rect">
+            <a:avLst/>
+          </a:prstGeom>
+          <a:noFill/>
+          <a:ln>
+            <a:solidFill>
+              <a:srgbClr val="C3C3C3"/>
+            </a:solidFill>
+          </a:ln>
+        </p:spPr>
+        <p:style>
+          <a:lnRef idx="2">
+            <a:schemeClr val="accent1">
+              <a:shade val="50000"/>
+            </a:schemeClr>
+          </a:lnRef>
+          <a:fillRef idx="1">
+            <a:schemeClr val="accent1"/>
+          </a:fillRef>
+          <a:effectRef idx="0">
+            <a:schemeClr val="accent1"/>
+          </a:effectRef>
+          <a:fontRef idx="minor">
+            <a:schemeClr val="lt1"/>
+          </a:fontRef>
+        </p:style>
+        <p:txBody>
+          <a:bodyPr rtlCol="0" anchor="ctr"/>
+          <a:lstStyle/>
+          <a:p>
+            <a:pPr algn="ctr"/>
+            <a:endParaRPr lang="en-US" dirty="0"/>
+          </a:p>
+        </p:txBody>
+      </p:sp>
+      <p:sp>
+        <p:nvSpPr>
+          <p:cNvPr id="6" name="Rectangle 5">
+            <a:extLst>
+              <a:ext uri="{FF2B5EF4-FFF2-40B4-BE49-F238E27FC236}">
+                <a16:creationId xmlns:a16="http://schemas.microsoft.com/office/drawing/2014/main" id="{415A0451-8DAD-49E3-A2A7-FD5D9BFC3A61}"/>
+              </a:ext>
+            </a:extLst>
+          </p:cNvPr>
+          <p:cNvSpPr/>
+          <p:nvPr/>
+        </p:nvSpPr>
+        <p:spPr>
+          <a:xfrm>
+            <a:off x="295564" y="1376217"/>
+            <a:ext cx="674254" cy="369332"/>
+          </a:xfrm>
+          <a:prstGeom prst="rect">
+            <a:avLst/>
+          </a:prstGeom>
+          <a:noFill/>
+          <a:ln w="38100">
+            <a:solidFill>
+              <a:srgbClr val="EF1B36"/>
+            </a:solidFill>
+            <a:headEnd type="none" w="med" len="med"/>
+            <a:tailEnd type="triangle" w="med" len="med"/>
+          </a:ln>
+        </p:spPr>
+        <p:style>
+          <a:lnRef idx="2">
+            <a:schemeClr val="accent1">
+              <a:shade val="50000"/>
+            </a:schemeClr>
+          </a:lnRef>
+          <a:fillRef idx="1">
+            <a:schemeClr val="accent1"/>
+          </a:fillRef>
+          <a:effectRef idx="0">
+            <a:schemeClr val="accent1"/>
+          </a:effectRef>
+          <a:fontRef idx="minor">
+            <a:schemeClr val="lt1"/>
+          </a:fontRef>
+        </p:style>
+        <p:txBody>
+          <a:bodyPr rot="0" spcFirstLastPara="0" vertOverflow="overflow" horzOverflow="overflow" vert="horz" wrap="square" lIns="91440" tIns="45720" rIns="91440" bIns="45720" numCol="1" spcCol="0" rtlCol="0" fromWordArt="0" anchor="ctr" anchorCtr="0" forceAA="0" compatLnSpc="1">
+            <a:prstTxWarp prst="textNoShape">
+              <a:avLst/>
+            </a:prstTxWarp>
+            <a:noAutofit/>
+          </a:bodyPr>
+          <a:lstStyle/>
+          <a:p>
+            <a:pPr algn="ctr"/>
+            <a:endParaRPr lang="en-US"/>
+          </a:p>
+        </p:txBody>
+      </p:sp>
+      <p:sp>
+        <p:nvSpPr>
+          <p:cNvPr id="7" name="Freeform: Shape 6">
+            <a:extLst>
+              <a:ext uri="{FF2B5EF4-FFF2-40B4-BE49-F238E27FC236}">
+                <a16:creationId xmlns:a16="http://schemas.microsoft.com/office/drawing/2014/main" id="{09244632-D161-4A86-A122-A07A181762E1}"/>
+              </a:ext>
+            </a:extLst>
+          </p:cNvPr>
+          <p:cNvSpPr/>
+          <p:nvPr/>
+        </p:nvSpPr>
+        <p:spPr>
+          <a:xfrm>
+            <a:off x="393325" y="1934169"/>
+            <a:ext cx="594966" cy="513467"/>
+          </a:xfrm>
+          <a:custGeom>
+            <a:avLst/>
+            <a:gdLst>
+              <a:gd name="connsiteX0" fmla="*/ 22311 w 594966"/>
+              <a:gd name="connsiteY0" fmla="*/ 513467 h 513467"/>
+              <a:gd name="connsiteX1" fmla="*/ 68493 w 594966"/>
+              <a:gd name="connsiteY1" fmla="*/ 42413 h 513467"/>
+              <a:gd name="connsiteX2" fmla="*/ 594966 w 594966"/>
+              <a:gd name="connsiteY2" fmla="*/ 51649 h 513467"/>
+            </a:gdLst>
+            <a:ahLst/>
+            <a:cxnLst>
+              <a:cxn ang="0">
+                <a:pos x="connsiteX0" y="connsiteY0"/>
+              </a:cxn>
+              <a:cxn ang="0">
+                <a:pos x="connsiteX1" y="connsiteY1"/>
+              </a:cxn>
+              <a:cxn ang="0">
+                <a:pos x="connsiteX2" y="connsiteY2"/>
+              </a:cxn>
+            </a:cxnLst>
+            <a:rect l="l" t="t" r="r" b="b"/>
+            <a:pathLst>
+              <a:path w="594966" h="513467">
+                <a:moveTo>
+                  <a:pt x="22311" y="513467"/>
+                </a:moveTo>
+                <a:cubicBezTo>
+                  <a:pt x="-2320" y="316425"/>
+                  <a:pt x="-26950" y="119383"/>
+                  <a:pt x="68493" y="42413"/>
+                </a:cubicBezTo>
+                <a:cubicBezTo>
+                  <a:pt x="163936" y="-34557"/>
+                  <a:pt x="379451" y="8546"/>
+                  <a:pt x="594966" y="51649"/>
+                </a:cubicBezTo>
+              </a:path>
+            </a:pathLst>
+          </a:custGeom>
+          <a:noFill/>
+          <a:ln w="38100">
+            <a:solidFill>
+              <a:srgbClr val="EF1B36"/>
+            </a:solidFill>
+            <a:headEnd type="none" w="med" len="med"/>
+            <a:tailEnd type="triangle" w="med" len="med"/>
+          </a:ln>
+        </p:spPr>
+        <p:style>
+          <a:lnRef idx="2">
+            <a:schemeClr val="accent1">
+              <a:shade val="50000"/>
+            </a:schemeClr>
+          </a:lnRef>
+          <a:fillRef idx="1">
+            <a:schemeClr val="accent1"/>
+          </a:fillRef>
+          <a:effectRef idx="0">
+            <a:schemeClr val="accent1"/>
+          </a:effectRef>
+          <a:fontRef idx="minor">
+            <a:schemeClr val="lt1"/>
+          </a:fontRef>
+        </p:style>
+        <p:txBody>
+          <a:bodyPr rtlCol="0" anchor="ctr"/>
+          <a:lstStyle/>
+          <a:p>
+            <a:pPr algn="ctr"/>
+            <a:endParaRPr lang="en-US"/>
+          </a:p>
+        </p:txBody>
+      </p:sp>
+      <p:pic>
+        <p:nvPicPr>
+          <p:cNvPr id="2" name="Picture 1">
+            <a:extLst>
+              <a:ext uri="{FF2B5EF4-FFF2-40B4-BE49-F238E27FC236}">
+                <a16:creationId xmlns:a16="http://schemas.microsoft.com/office/drawing/2014/main" id="{6B675A84-99BB-4174-A25E-E404EBAE6936}"/>
+              </a:ext>
+            </a:extLst>
+          </p:cNvPr>
+          <p:cNvPicPr>
+            <a:picLocks noChangeAspect="1"/>
+          </p:cNvPicPr>
+          <p:nvPr/>
+        </p:nvPicPr>
+        <p:blipFill>
+          <a:blip r:embed="rId2"/>
+          <a:stretch>
+            <a:fillRect/>
+          </a:stretch>
+        </p:blipFill>
+        <p:spPr>
+          <a:xfrm>
+            <a:off x="3357353" y="261343"/>
+            <a:ext cx="1448002" cy="1867161"/>
+          </a:xfrm>
+          <a:prstGeom prst="rect">
+            <a:avLst/>
+          </a:prstGeom>
+        </p:spPr>
+      </p:pic>
+      <p:pic>
+        <p:nvPicPr>
+          <p:cNvPr id="24" name="Picture 23">
+            <a:extLst>
+              <a:ext uri="{FF2B5EF4-FFF2-40B4-BE49-F238E27FC236}">
+                <a16:creationId xmlns:a16="http://schemas.microsoft.com/office/drawing/2014/main" id="{A81976ED-1B59-42E8-B1E8-2127FDDD0323}"/>
+              </a:ext>
+            </a:extLst>
+          </p:cNvPr>
+          <p:cNvPicPr>
+            <a:picLocks noChangeAspect="1"/>
+          </p:cNvPicPr>
+          <p:nvPr/>
+        </p:nvPicPr>
+        <p:blipFill rotWithShape="1">
+          <a:blip r:embed="rId3"/>
+          <a:srcRect l="37165" b="41264"/>
+          <a:stretch/>
+        </p:blipFill>
+        <p:spPr>
+          <a:xfrm>
+            <a:off x="1509823" y="749571"/>
+            <a:ext cx="1370755" cy="968004"/>
+          </a:xfrm>
+          <a:prstGeom prst="rect">
+            <a:avLst/>
+          </a:prstGeom>
+        </p:spPr>
+      </p:pic>
+      <p:sp>
+        <p:nvSpPr>
+          <p:cNvPr id="25" name="Rectangle 24">
+            <a:extLst>
+              <a:ext uri="{FF2B5EF4-FFF2-40B4-BE49-F238E27FC236}">
+                <a16:creationId xmlns:a16="http://schemas.microsoft.com/office/drawing/2014/main" id="{B1C2E1DD-93E9-4322-8A91-695B5F2AD807}"/>
+              </a:ext>
+            </a:extLst>
+          </p:cNvPr>
+          <p:cNvSpPr/>
+          <p:nvPr/>
+        </p:nvSpPr>
+        <p:spPr>
+          <a:xfrm>
+            <a:off x="2326383" y="1358876"/>
+            <a:ext cx="310491" cy="282021"/>
+          </a:xfrm>
+          <a:prstGeom prst="rect">
+            <a:avLst/>
+          </a:prstGeom>
+          <a:noFill/>
+          <a:ln w="38100">
+            <a:solidFill>
+              <a:srgbClr val="EF1B36"/>
+            </a:solidFill>
+            <a:headEnd type="none" w="med" len="med"/>
+            <a:tailEnd type="triangle" w="med" len="med"/>
+          </a:ln>
+        </p:spPr>
+        <p:style>
+          <a:lnRef idx="2">
+            <a:schemeClr val="accent1">
+              <a:shade val="50000"/>
+            </a:schemeClr>
+          </a:lnRef>
+          <a:fillRef idx="1">
+            <a:schemeClr val="accent1"/>
+          </a:fillRef>
+          <a:effectRef idx="0">
+            <a:schemeClr val="accent1"/>
+          </a:effectRef>
+          <a:fontRef idx="minor">
+            <a:schemeClr val="lt1"/>
+          </a:fontRef>
+        </p:style>
+        <p:txBody>
+          <a:bodyPr rot="0" spcFirstLastPara="0" vertOverflow="overflow" horzOverflow="overflow" vert="horz" wrap="square" lIns="91440" tIns="45720" rIns="91440" bIns="45720" numCol="1" spcCol="0" rtlCol="0" fromWordArt="0" anchor="ctr" anchorCtr="0" forceAA="0" compatLnSpc="1">
+            <a:prstTxWarp prst="textNoShape">
+              <a:avLst/>
+            </a:prstTxWarp>
+            <a:noAutofit/>
+          </a:bodyPr>
+          <a:lstStyle/>
+          <a:p>
+            <a:pPr algn="ctr"/>
+            <a:endParaRPr lang="en-US"/>
+          </a:p>
+        </p:txBody>
+      </p:sp>
+      <p:sp>
+        <p:nvSpPr>
+          <p:cNvPr id="26" name="Freeform: Shape 25">
+            <a:extLst>
+              <a:ext uri="{FF2B5EF4-FFF2-40B4-BE49-F238E27FC236}">
+                <a16:creationId xmlns:a16="http://schemas.microsoft.com/office/drawing/2014/main" id="{7603DA5A-4B63-4308-BB70-A5BBFDD5B0AA}"/>
+              </a:ext>
+            </a:extLst>
+          </p:cNvPr>
+          <p:cNvSpPr/>
+          <p:nvPr/>
+        </p:nvSpPr>
+        <p:spPr>
+          <a:xfrm rot="462665">
+            <a:off x="2747248" y="971419"/>
+            <a:ext cx="499731" cy="540968"/>
+          </a:xfrm>
+          <a:custGeom>
+            <a:avLst/>
+            <a:gdLst>
+              <a:gd name="connsiteX0" fmla="*/ 0 w 499731"/>
+              <a:gd name="connsiteY0" fmla="*/ 520995 h 540968"/>
+              <a:gd name="connsiteX1" fmla="*/ 297712 w 499731"/>
+              <a:gd name="connsiteY1" fmla="*/ 478465 h 540968"/>
+              <a:gd name="connsiteX2" fmla="*/ 499731 w 499731"/>
+              <a:gd name="connsiteY2" fmla="*/ 0 h 540968"/>
+            </a:gdLst>
+            <a:ahLst/>
+            <a:cxnLst>
+              <a:cxn ang="0">
+                <a:pos x="connsiteX0" y="connsiteY0"/>
+              </a:cxn>
+              <a:cxn ang="0">
+                <a:pos x="connsiteX1" y="connsiteY1"/>
+              </a:cxn>
+              <a:cxn ang="0">
+                <a:pos x="connsiteX2" y="connsiteY2"/>
+              </a:cxn>
+            </a:cxnLst>
+            <a:rect l="l" t="t" r="r" b="b"/>
+            <a:pathLst>
+              <a:path w="499731" h="540968">
+                <a:moveTo>
+                  <a:pt x="0" y="520995"/>
+                </a:moveTo>
+                <a:cubicBezTo>
+                  <a:pt x="107212" y="543146"/>
+                  <a:pt x="214424" y="565298"/>
+                  <a:pt x="297712" y="478465"/>
+                </a:cubicBezTo>
+                <a:cubicBezTo>
+                  <a:pt x="381001" y="391632"/>
+                  <a:pt x="440366" y="195816"/>
+                  <a:pt x="499731" y="0"/>
+                </a:cubicBezTo>
+              </a:path>
+            </a:pathLst>
+          </a:custGeom>
+          <a:noFill/>
+          <a:ln w="38100">
+            <a:solidFill>
+              <a:srgbClr val="EF1B36"/>
+            </a:solidFill>
+            <a:headEnd type="none" w="med" len="med"/>
+            <a:tailEnd type="triangle" w="med" len="med"/>
+          </a:ln>
+        </p:spPr>
+        <p:style>
+          <a:lnRef idx="2">
+            <a:schemeClr val="accent1">
+              <a:shade val="50000"/>
+            </a:schemeClr>
+          </a:lnRef>
+          <a:fillRef idx="1">
+            <a:schemeClr val="accent1"/>
+          </a:fillRef>
+          <a:effectRef idx="0">
+            <a:schemeClr val="accent1"/>
+          </a:effectRef>
+          <a:fontRef idx="minor">
+            <a:schemeClr val="lt1"/>
+          </a:fontRef>
+        </p:style>
+        <p:txBody>
+          <a:bodyPr rtlCol="0" anchor="ctr"/>
+          <a:lstStyle/>
+          <a:p>
+            <a:pPr algn="ctr"/>
+            <a:endParaRPr lang="en-US"/>
+          </a:p>
+        </p:txBody>
+      </p:sp>
+      <p:sp>
+        <p:nvSpPr>
+          <p:cNvPr id="27" name="Rectangle 26">
+            <a:extLst>
+              <a:ext uri="{FF2B5EF4-FFF2-40B4-BE49-F238E27FC236}">
+                <a16:creationId xmlns:a16="http://schemas.microsoft.com/office/drawing/2014/main" id="{3CFA706D-2635-4D8A-8C6D-09CD126AA631}"/>
+              </a:ext>
+            </a:extLst>
+          </p:cNvPr>
+          <p:cNvSpPr/>
+          <p:nvPr/>
+        </p:nvSpPr>
+        <p:spPr>
+          <a:xfrm>
+            <a:off x="1528296" y="223099"/>
+            <a:ext cx="3366287" cy="1991956"/>
+          </a:xfrm>
+          <a:prstGeom prst="rect">
+            <a:avLst/>
+          </a:prstGeom>
+          <a:noFill/>
+          <a:ln>
+            <a:solidFill>
+              <a:srgbClr val="C3C3C3"/>
+            </a:solidFill>
+          </a:ln>
+        </p:spPr>
+        <p:style>
+          <a:lnRef idx="2">
+            <a:schemeClr val="accent1">
+              <a:shade val="50000"/>
+            </a:schemeClr>
+          </a:lnRef>
+          <a:fillRef idx="1">
+            <a:schemeClr val="accent1"/>
+          </a:fillRef>
+          <a:effectRef idx="0">
+            <a:schemeClr val="accent1"/>
+          </a:effectRef>
+          <a:fontRef idx="minor">
+            <a:schemeClr val="lt1"/>
+          </a:fontRef>
+        </p:style>
+        <p:txBody>
+          <a:bodyPr rtlCol="0" anchor="ctr"/>
+          <a:lstStyle/>
+          <a:p>
+            <a:pPr algn="ctr"/>
+            <a:endParaRPr lang="en-US" dirty="0"/>
+          </a:p>
+        </p:txBody>
+      </p:sp>
+      <p:pic>
+        <p:nvPicPr>
+          <p:cNvPr id="28" name="Picture 27">
+            <a:extLst>
+              <a:ext uri="{FF2B5EF4-FFF2-40B4-BE49-F238E27FC236}">
+                <a16:creationId xmlns:a16="http://schemas.microsoft.com/office/drawing/2014/main" id="{36C598E9-A03A-45D0-AB7D-A10346FB68E6}"/>
+              </a:ext>
+            </a:extLst>
+          </p:cNvPr>
+          <p:cNvPicPr>
+            <a:picLocks noChangeAspect="1"/>
+          </p:cNvPicPr>
+          <p:nvPr/>
+        </p:nvPicPr>
+        <p:blipFill rotWithShape="1">
+          <a:blip r:embed="rId4"/>
+          <a:srcRect b="45063"/>
+          <a:stretch/>
+        </p:blipFill>
+        <p:spPr>
+          <a:xfrm>
+            <a:off x="5110070" y="223100"/>
+            <a:ext cx="4658375" cy="2339348"/>
+          </a:xfrm>
+          <a:prstGeom prst="rect">
+            <a:avLst/>
+          </a:prstGeom>
+        </p:spPr>
+      </p:pic>
+      <p:sp>
+        <p:nvSpPr>
+          <p:cNvPr id="29" name="Rectangle 28">
+            <a:extLst>
+              <a:ext uri="{FF2B5EF4-FFF2-40B4-BE49-F238E27FC236}">
+                <a16:creationId xmlns:a16="http://schemas.microsoft.com/office/drawing/2014/main" id="{0CC7BF58-9A61-4A55-9396-009F2AA4B17E}"/>
+              </a:ext>
+            </a:extLst>
+          </p:cNvPr>
+          <p:cNvSpPr/>
+          <p:nvPr/>
+        </p:nvSpPr>
+        <p:spPr>
+          <a:xfrm>
+            <a:off x="7844680" y="1955435"/>
+            <a:ext cx="1682091" cy="280886"/>
+          </a:xfrm>
+          <a:prstGeom prst="rect">
+            <a:avLst/>
+          </a:prstGeom>
+          <a:noFill/>
+          <a:ln w="38100">
+            <a:solidFill>
+              <a:srgbClr val="EF1B36"/>
+            </a:solidFill>
+            <a:headEnd type="none" w="med" len="med"/>
+            <a:tailEnd type="triangle" w="med" len="med"/>
+          </a:ln>
+        </p:spPr>
+        <p:style>
+          <a:lnRef idx="2">
+            <a:schemeClr val="accent1">
+              <a:shade val="50000"/>
+            </a:schemeClr>
+          </a:lnRef>
+          <a:fillRef idx="1">
+            <a:schemeClr val="accent1"/>
+          </a:fillRef>
+          <a:effectRef idx="0">
+            <a:schemeClr val="accent1"/>
+          </a:effectRef>
+          <a:fontRef idx="minor">
+            <a:schemeClr val="lt1"/>
+          </a:fontRef>
+        </p:style>
+        <p:txBody>
+          <a:bodyPr rot="0" spcFirstLastPara="0" vertOverflow="overflow" horzOverflow="overflow" vert="horz" wrap="square" lIns="91440" tIns="45720" rIns="91440" bIns="45720" numCol="1" spcCol="0" rtlCol="0" fromWordArt="0" anchor="ctr" anchorCtr="0" forceAA="0" compatLnSpc="1">
+            <a:prstTxWarp prst="textNoShape">
+              <a:avLst/>
+            </a:prstTxWarp>
+            <a:noAutofit/>
+          </a:bodyPr>
+          <a:lstStyle/>
+          <a:p>
+            <a:pPr algn="ctr"/>
+            <a:endParaRPr lang="en-US"/>
+          </a:p>
+        </p:txBody>
+      </p:sp>
+      <p:pic>
+        <p:nvPicPr>
+          <p:cNvPr id="30" name="Picture 29">
+            <a:extLst>
+              <a:ext uri="{FF2B5EF4-FFF2-40B4-BE49-F238E27FC236}">
+                <a16:creationId xmlns:a16="http://schemas.microsoft.com/office/drawing/2014/main" id="{F2AC2BBB-FB8A-4165-98CC-5106014AB332}"/>
+              </a:ext>
+            </a:extLst>
+          </p:cNvPr>
+          <p:cNvPicPr>
+            <a:picLocks noChangeAspect="1"/>
+          </p:cNvPicPr>
+          <p:nvPr/>
+        </p:nvPicPr>
+        <p:blipFill>
+          <a:blip r:embed="rId5"/>
+          <a:stretch>
+            <a:fillRect/>
+          </a:stretch>
+        </p:blipFill>
+        <p:spPr>
+          <a:xfrm>
+            <a:off x="372296" y="2930147"/>
+            <a:ext cx="6800850" cy="6276975"/>
+          </a:xfrm>
+          <a:prstGeom prst="rect">
+            <a:avLst/>
+          </a:prstGeom>
+        </p:spPr>
+      </p:pic>
+    </p:spTree>
+    <p:extLst>
+      <p:ext uri="{BB962C8B-B14F-4D97-AF65-F5344CB8AC3E}">
+        <p14:creationId xmlns:p14="http://schemas.microsoft.com/office/powerpoint/2010/main" val="2278735835"/>
+      </p:ext>
+    </p:extLst>
+  </p:cSld>
+  <p:clrMapOvr>
+    <a:masterClrMapping/>
+  </p:clrMapOvr>
+</p:sld>
+</file>
+
+<file path=ppt/slides/slide8.xml><?xml version="1.0" encoding="utf-8"?>
+<p:sld xmlns:a="http://schemas.openxmlformats.org/drawingml/2006/main" xmlns:r="http://schemas.openxmlformats.org/officeDocument/2006/relationships" xmlns:p="http://schemas.openxmlformats.org/presentationml/2006/main">
+  <p:cSld>
+    <p:spTree>
+      <p:nvGrpSpPr>
+        <p:cNvPr id="1" name=""/>
+        <p:cNvGrpSpPr/>
+        <p:nvPr/>
+      </p:nvGrpSpPr>
+      <p:grpSpPr>
+        <a:xfrm>
+          <a:off x="0" y="0"/>
+          <a:ext cx="0" cy="0"/>
+          <a:chOff x="0" y="0"/>
+          <a:chExt cx="0" cy="0"/>
+        </a:xfrm>
+      </p:grpSpPr>
+      <p:sp>
+        <p:nvSpPr>
+          <p:cNvPr id="4" name="TextBox 3">
+            <a:extLst>
+              <a:ext uri="{FF2B5EF4-FFF2-40B4-BE49-F238E27FC236}">
+                <a16:creationId xmlns:a16="http://schemas.microsoft.com/office/drawing/2014/main" id="{1902A060-3F5D-498A-8030-6D72EF7E49CC}"/>
+              </a:ext>
+            </a:extLst>
+          </p:cNvPr>
+          <p:cNvSpPr txBox="1"/>
+          <p:nvPr/>
+        </p:nvSpPr>
+        <p:spPr>
+          <a:xfrm>
+            <a:off x="295564" y="323273"/>
+            <a:ext cx="489236" cy="369332"/>
+          </a:xfrm>
+          <a:prstGeom prst="rect">
+            <a:avLst/>
+          </a:prstGeom>
+          <a:noFill/>
+        </p:spPr>
+        <p:txBody>
+          <a:bodyPr wrap="none" rtlCol="0">
+            <a:spAutoFit/>
+          </a:bodyPr>
+          <a:lstStyle/>
+          <a:p>
+            <a:r>
+              <a:rPr lang="en-US" dirty="0"/>
+              <a:t>2-3</a:t>
+            </a:r>
+          </a:p>
+        </p:txBody>
+      </p:sp>
+      <p:sp>
+        <p:nvSpPr>
+          <p:cNvPr id="5" name="Rectangle 4">
+            <a:extLst>
+              <a:ext uri="{FF2B5EF4-FFF2-40B4-BE49-F238E27FC236}">
+                <a16:creationId xmlns:a16="http://schemas.microsoft.com/office/drawing/2014/main" id="{E630D68F-326E-4783-9693-D14B7A345BF1}"/>
+              </a:ext>
+            </a:extLst>
+          </p:cNvPr>
+          <p:cNvSpPr/>
+          <p:nvPr/>
+        </p:nvSpPr>
+        <p:spPr>
+          <a:xfrm>
+            <a:off x="295564" y="849745"/>
+            <a:ext cx="674254" cy="369332"/>
+          </a:xfrm>
+          <a:prstGeom prst="rect">
+            <a:avLst/>
+          </a:prstGeom>
+          <a:noFill/>
+          <a:ln>
+            <a:solidFill>
+              <a:srgbClr val="C3C3C3"/>
+            </a:solidFill>
+          </a:ln>
+        </p:spPr>
+        <p:style>
+          <a:lnRef idx="2">
+            <a:schemeClr val="accent1">
+              <a:shade val="50000"/>
+            </a:schemeClr>
+          </a:lnRef>
+          <a:fillRef idx="1">
+            <a:schemeClr val="accent1"/>
+          </a:fillRef>
+          <a:effectRef idx="0">
+            <a:schemeClr val="accent1"/>
+          </a:effectRef>
+          <a:fontRef idx="minor">
+            <a:schemeClr val="lt1"/>
+          </a:fontRef>
+        </p:style>
+        <p:txBody>
+          <a:bodyPr rtlCol="0" anchor="ctr"/>
+          <a:lstStyle/>
+          <a:p>
+            <a:pPr algn="ctr"/>
+            <a:endParaRPr lang="en-US" dirty="0"/>
+          </a:p>
+        </p:txBody>
+      </p:sp>
+      <p:sp>
+        <p:nvSpPr>
+          <p:cNvPr id="6" name="Rectangle 5">
+            <a:extLst>
+              <a:ext uri="{FF2B5EF4-FFF2-40B4-BE49-F238E27FC236}">
+                <a16:creationId xmlns:a16="http://schemas.microsoft.com/office/drawing/2014/main" id="{415A0451-8DAD-49E3-A2A7-FD5D9BFC3A61}"/>
+              </a:ext>
+            </a:extLst>
+          </p:cNvPr>
+          <p:cNvSpPr/>
+          <p:nvPr/>
+        </p:nvSpPr>
+        <p:spPr>
+          <a:xfrm>
+            <a:off x="295564" y="1376217"/>
+            <a:ext cx="674254" cy="369332"/>
+          </a:xfrm>
+          <a:prstGeom prst="rect">
+            <a:avLst/>
+          </a:prstGeom>
+          <a:noFill/>
+          <a:ln w="38100">
+            <a:solidFill>
+              <a:srgbClr val="EF1B36"/>
+            </a:solidFill>
+            <a:headEnd type="none" w="med" len="med"/>
+            <a:tailEnd type="triangle" w="med" len="med"/>
+          </a:ln>
+        </p:spPr>
+        <p:style>
+          <a:lnRef idx="2">
+            <a:schemeClr val="accent1">
+              <a:shade val="50000"/>
+            </a:schemeClr>
+          </a:lnRef>
+          <a:fillRef idx="1">
+            <a:schemeClr val="accent1"/>
+          </a:fillRef>
+          <a:effectRef idx="0">
+            <a:schemeClr val="accent1"/>
+          </a:effectRef>
+          <a:fontRef idx="minor">
+            <a:schemeClr val="lt1"/>
+          </a:fontRef>
+        </p:style>
+        <p:txBody>
+          <a:bodyPr rot="0" spcFirstLastPara="0" vertOverflow="overflow" horzOverflow="overflow" vert="horz" wrap="square" lIns="91440" tIns="45720" rIns="91440" bIns="45720" numCol="1" spcCol="0" rtlCol="0" fromWordArt="0" anchor="ctr" anchorCtr="0" forceAA="0" compatLnSpc="1">
+            <a:prstTxWarp prst="textNoShape">
+              <a:avLst/>
+            </a:prstTxWarp>
+            <a:noAutofit/>
+          </a:bodyPr>
+          <a:lstStyle/>
+          <a:p>
+            <a:pPr algn="ctr"/>
+            <a:endParaRPr lang="en-US"/>
+          </a:p>
+        </p:txBody>
+      </p:sp>
+      <p:sp>
+        <p:nvSpPr>
+          <p:cNvPr id="7" name="Freeform: Shape 6">
+            <a:extLst>
+              <a:ext uri="{FF2B5EF4-FFF2-40B4-BE49-F238E27FC236}">
+                <a16:creationId xmlns:a16="http://schemas.microsoft.com/office/drawing/2014/main" id="{09244632-D161-4A86-A122-A07A181762E1}"/>
+              </a:ext>
+            </a:extLst>
+          </p:cNvPr>
+          <p:cNvSpPr/>
+          <p:nvPr/>
+        </p:nvSpPr>
+        <p:spPr>
+          <a:xfrm>
+            <a:off x="393325" y="1934169"/>
+            <a:ext cx="594966" cy="513467"/>
+          </a:xfrm>
+          <a:custGeom>
+            <a:avLst/>
+            <a:gdLst>
+              <a:gd name="connsiteX0" fmla="*/ 22311 w 594966"/>
+              <a:gd name="connsiteY0" fmla="*/ 513467 h 513467"/>
+              <a:gd name="connsiteX1" fmla="*/ 68493 w 594966"/>
+              <a:gd name="connsiteY1" fmla="*/ 42413 h 513467"/>
+              <a:gd name="connsiteX2" fmla="*/ 594966 w 594966"/>
+              <a:gd name="connsiteY2" fmla="*/ 51649 h 513467"/>
+            </a:gdLst>
+            <a:ahLst/>
+            <a:cxnLst>
+              <a:cxn ang="0">
+                <a:pos x="connsiteX0" y="connsiteY0"/>
+              </a:cxn>
+              <a:cxn ang="0">
+                <a:pos x="connsiteX1" y="connsiteY1"/>
+              </a:cxn>
+              <a:cxn ang="0">
+                <a:pos x="connsiteX2" y="connsiteY2"/>
+              </a:cxn>
+            </a:cxnLst>
+            <a:rect l="l" t="t" r="r" b="b"/>
+            <a:pathLst>
+              <a:path w="594966" h="513467">
+                <a:moveTo>
+                  <a:pt x="22311" y="513467"/>
+                </a:moveTo>
+                <a:cubicBezTo>
+                  <a:pt x="-2320" y="316425"/>
+                  <a:pt x="-26950" y="119383"/>
+                  <a:pt x="68493" y="42413"/>
+                </a:cubicBezTo>
+                <a:cubicBezTo>
+                  <a:pt x="163936" y="-34557"/>
+                  <a:pt x="379451" y="8546"/>
+                  <a:pt x="594966" y="51649"/>
+                </a:cubicBezTo>
+              </a:path>
+            </a:pathLst>
+          </a:custGeom>
+          <a:noFill/>
+          <a:ln w="38100">
+            <a:solidFill>
+              <a:srgbClr val="EF1B36"/>
+            </a:solidFill>
+            <a:headEnd type="none" w="med" len="med"/>
+            <a:tailEnd type="triangle" w="med" len="med"/>
+          </a:ln>
+        </p:spPr>
+        <p:style>
+          <a:lnRef idx="2">
+            <a:schemeClr val="accent1">
+              <a:shade val="50000"/>
+            </a:schemeClr>
+          </a:lnRef>
+          <a:fillRef idx="1">
+            <a:schemeClr val="accent1"/>
+          </a:fillRef>
+          <a:effectRef idx="0">
+            <a:schemeClr val="accent1"/>
+          </a:effectRef>
+          <a:fontRef idx="minor">
+            <a:schemeClr val="lt1"/>
+          </a:fontRef>
+        </p:style>
+        <p:txBody>
+          <a:bodyPr rtlCol="0" anchor="ctr"/>
+          <a:lstStyle/>
+          <a:p>
+            <a:pPr algn="ctr"/>
+            <a:endParaRPr lang="en-US"/>
+          </a:p>
+        </p:txBody>
+      </p:sp>
+      <p:pic>
+        <p:nvPicPr>
+          <p:cNvPr id="3" name="Picture 2">
+            <a:extLst>
+              <a:ext uri="{FF2B5EF4-FFF2-40B4-BE49-F238E27FC236}">
+                <a16:creationId xmlns:a16="http://schemas.microsoft.com/office/drawing/2014/main" id="{72FA701C-3117-4C58-B881-D81DC14B9DE7}"/>
+              </a:ext>
+            </a:extLst>
+          </p:cNvPr>
+          <p:cNvPicPr>
+            <a:picLocks noChangeAspect="1"/>
+          </p:cNvPicPr>
+          <p:nvPr/>
+        </p:nvPicPr>
+        <p:blipFill>
+          <a:blip r:embed="rId2"/>
+          <a:stretch>
+            <a:fillRect/>
+          </a:stretch>
+        </p:blipFill>
+        <p:spPr>
+          <a:xfrm>
+            <a:off x="1819496" y="523752"/>
+            <a:ext cx="5448300" cy="1390650"/>
+          </a:xfrm>
+          <a:prstGeom prst="rect">
+            <a:avLst/>
+          </a:prstGeom>
+        </p:spPr>
+      </p:pic>
+      <p:sp>
+        <p:nvSpPr>
+          <p:cNvPr id="15" name="Rectangle 14">
+            <a:extLst>
+              <a:ext uri="{FF2B5EF4-FFF2-40B4-BE49-F238E27FC236}">
+                <a16:creationId xmlns:a16="http://schemas.microsoft.com/office/drawing/2014/main" id="{433F4A35-C8BD-428A-A058-FA6B9FADE725}"/>
+              </a:ext>
+            </a:extLst>
+          </p:cNvPr>
+          <p:cNvSpPr/>
+          <p:nvPr/>
+        </p:nvSpPr>
+        <p:spPr>
+          <a:xfrm>
+            <a:off x="2379545" y="1450645"/>
+            <a:ext cx="3351403" cy="369332"/>
+          </a:xfrm>
+          <a:prstGeom prst="rect">
+            <a:avLst/>
+          </a:prstGeom>
+          <a:noFill/>
+          <a:ln w="38100">
+            <a:solidFill>
+              <a:srgbClr val="EF1B36"/>
+            </a:solidFill>
+            <a:headEnd type="none" w="med" len="med"/>
+            <a:tailEnd type="triangle" w="med" len="med"/>
+          </a:ln>
+        </p:spPr>
+        <p:style>
+          <a:lnRef idx="2">
+            <a:schemeClr val="accent1">
+              <a:shade val="50000"/>
+            </a:schemeClr>
+          </a:lnRef>
+          <a:fillRef idx="1">
+            <a:schemeClr val="accent1"/>
+          </a:fillRef>
+          <a:effectRef idx="0">
+            <a:schemeClr val="accent1"/>
+          </a:effectRef>
+          <a:fontRef idx="minor">
+            <a:schemeClr val="lt1"/>
+          </a:fontRef>
+        </p:style>
+        <p:txBody>
+          <a:bodyPr rot="0" spcFirstLastPara="0" vertOverflow="overflow" horzOverflow="overflow" vert="horz" wrap="square" lIns="91440" tIns="45720" rIns="91440" bIns="45720" numCol="1" spcCol="0" rtlCol="0" fromWordArt="0" anchor="ctr" anchorCtr="0" forceAA="0" compatLnSpc="1">
+            <a:prstTxWarp prst="textNoShape">
+              <a:avLst/>
+            </a:prstTxWarp>
+            <a:noAutofit/>
+          </a:bodyPr>
+          <a:lstStyle/>
+          <a:p>
+            <a:pPr algn="ctr"/>
+            <a:endParaRPr lang="en-US"/>
+          </a:p>
+        </p:txBody>
+      </p:sp>
+    </p:spTree>
+    <p:extLst>
+      <p:ext uri="{BB962C8B-B14F-4D97-AF65-F5344CB8AC3E}">
+        <p14:creationId xmlns:p14="http://schemas.microsoft.com/office/powerpoint/2010/main" val="3778870740"/>
+      </p:ext>
+    </p:extLst>
+  </p:cSld>
+  <p:clrMapOvr>
+    <a:masterClrMapping/>
+  </p:clrMapOvr>
+</p:sld>
+</file>
+
+<file path=ppt/slides/slide9.xml><?xml version="1.0" encoding="utf-8"?>
+<p:sld xmlns:a="http://schemas.openxmlformats.org/drawingml/2006/main" xmlns:r="http://schemas.openxmlformats.org/officeDocument/2006/relationships" xmlns:p="http://schemas.openxmlformats.org/presentationml/2006/main">
+  <p:cSld>
+    <p:spTree>
+      <p:nvGrpSpPr>
+        <p:cNvPr id="1" name=""/>
+        <p:cNvGrpSpPr/>
+        <p:nvPr/>
+      </p:nvGrpSpPr>
+      <p:grpSpPr>
+        <a:xfrm>
+          <a:off x="0" y="0"/>
+          <a:ext cx="0" cy="0"/>
+          <a:chOff x="0" y="0"/>
+          <a:chExt cx="0" cy="0"/>
+        </a:xfrm>
+      </p:grpSpPr>
+      <p:sp>
+        <p:nvSpPr>
+          <p:cNvPr id="4" name="TextBox 3">
+            <a:extLst>
+              <a:ext uri="{FF2B5EF4-FFF2-40B4-BE49-F238E27FC236}">
+                <a16:creationId xmlns:a16="http://schemas.microsoft.com/office/drawing/2014/main" id="{1902A060-3F5D-498A-8030-6D72EF7E49CC}"/>
+              </a:ext>
+            </a:extLst>
+          </p:cNvPr>
+          <p:cNvSpPr txBox="1"/>
+          <p:nvPr/>
+        </p:nvSpPr>
+        <p:spPr>
+          <a:xfrm>
+            <a:off x="295564" y="323273"/>
+            <a:ext cx="968535" cy="369332"/>
+          </a:xfrm>
+          <a:prstGeom prst="rect">
+            <a:avLst/>
+          </a:prstGeom>
+          <a:noFill/>
+        </p:spPr>
+        <p:txBody>
+          <a:bodyPr wrap="none" rtlCol="0">
+            <a:spAutoFit/>
+          </a:bodyPr>
+          <a:lstStyle/>
+          <a:p>
+            <a:r>
+              <a:rPr lang="en-US" dirty="0"/>
+              <a:t>2-4 (lab)</a:t>
+            </a:r>
+          </a:p>
+        </p:txBody>
+      </p:sp>
+      <p:sp>
+        <p:nvSpPr>
+          <p:cNvPr id="5" name="Rectangle 4">
+            <a:extLst>
+              <a:ext uri="{FF2B5EF4-FFF2-40B4-BE49-F238E27FC236}">
+                <a16:creationId xmlns:a16="http://schemas.microsoft.com/office/drawing/2014/main" id="{E630D68F-326E-4783-9693-D14B7A345BF1}"/>
+              </a:ext>
+            </a:extLst>
+          </p:cNvPr>
+          <p:cNvSpPr/>
+          <p:nvPr/>
+        </p:nvSpPr>
+        <p:spPr>
+          <a:xfrm>
+            <a:off x="295564" y="849745"/>
+            <a:ext cx="674254" cy="369332"/>
+          </a:xfrm>
+          <a:prstGeom prst="rect">
+            <a:avLst/>
+          </a:prstGeom>
+          <a:noFill/>
+          <a:ln>
+            <a:solidFill>
+              <a:srgbClr val="C3C3C3"/>
+            </a:solidFill>
+          </a:ln>
+        </p:spPr>
+        <p:style>
+          <a:lnRef idx="2">
+            <a:schemeClr val="accent1">
+              <a:shade val="50000"/>
+            </a:schemeClr>
+          </a:lnRef>
+          <a:fillRef idx="1">
+            <a:schemeClr val="accent1"/>
+          </a:fillRef>
+          <a:effectRef idx="0">
+            <a:schemeClr val="accent1"/>
+          </a:effectRef>
+          <a:fontRef idx="minor">
+            <a:schemeClr val="lt1"/>
+          </a:fontRef>
+        </p:style>
+        <p:txBody>
+          <a:bodyPr rtlCol="0" anchor="ctr"/>
+          <a:lstStyle/>
+          <a:p>
+            <a:pPr algn="ctr"/>
+            <a:endParaRPr lang="en-US" dirty="0"/>
+          </a:p>
+        </p:txBody>
+      </p:sp>
+      <p:pic>
+        <p:nvPicPr>
+          <p:cNvPr id="8" name="Picture 7">
+            <a:extLst>
+              <a:ext uri="{FF2B5EF4-FFF2-40B4-BE49-F238E27FC236}">
+                <a16:creationId xmlns:a16="http://schemas.microsoft.com/office/drawing/2014/main" id="{04A113D0-3F64-4C54-84E9-4A1DB06C7CD1}"/>
+              </a:ext>
+            </a:extLst>
+          </p:cNvPr>
+          <p:cNvPicPr>
+            <a:picLocks noChangeAspect="1"/>
+          </p:cNvPicPr>
+          <p:nvPr/>
+        </p:nvPicPr>
+        <p:blipFill rotWithShape="1">
+          <a:blip r:embed="rId2"/>
+          <a:srcRect r="38433"/>
+          <a:stretch/>
+        </p:blipFill>
+        <p:spPr>
+          <a:xfrm>
+            <a:off x="1769228" y="507939"/>
+            <a:ext cx="6715554" cy="4667901"/>
+          </a:xfrm>
+          <a:prstGeom prst="rect">
+            <a:avLst/>
+          </a:prstGeom>
+          <a:noFill/>
+          <a:ln>
+            <a:solidFill>
+              <a:srgbClr val="C3C3C3"/>
+            </a:solidFill>
+          </a:ln>
+        </p:spPr>
+      </p:pic>
+      <p:sp>
+        <p:nvSpPr>
+          <p:cNvPr id="6" name="Rectangle 5">
+            <a:extLst>
+              <a:ext uri="{FF2B5EF4-FFF2-40B4-BE49-F238E27FC236}">
+                <a16:creationId xmlns:a16="http://schemas.microsoft.com/office/drawing/2014/main" id="{415A0451-8DAD-49E3-A2A7-FD5D9BFC3A61}"/>
+              </a:ext>
+            </a:extLst>
+          </p:cNvPr>
+          <p:cNvSpPr/>
+          <p:nvPr/>
+        </p:nvSpPr>
+        <p:spPr>
+          <a:xfrm>
+            <a:off x="295564" y="1376217"/>
+            <a:ext cx="674254" cy="369332"/>
+          </a:xfrm>
+          <a:prstGeom prst="rect">
+            <a:avLst/>
+          </a:prstGeom>
+          <a:noFill/>
+          <a:ln w="38100">
+            <a:solidFill>
+              <a:srgbClr val="EF1B36"/>
+            </a:solidFill>
+            <a:headEnd type="none" w="med" len="med"/>
+            <a:tailEnd type="triangle" w="med" len="med"/>
+          </a:ln>
+        </p:spPr>
+        <p:style>
+          <a:lnRef idx="2">
+            <a:schemeClr val="accent1">
+              <a:shade val="50000"/>
+            </a:schemeClr>
+          </a:lnRef>
+          <a:fillRef idx="1">
+            <a:schemeClr val="accent1"/>
+          </a:fillRef>
+          <a:effectRef idx="0">
+            <a:schemeClr val="accent1"/>
+          </a:effectRef>
+          <a:fontRef idx="minor">
+            <a:schemeClr val="lt1"/>
+          </a:fontRef>
+        </p:style>
+        <p:txBody>
+          <a:bodyPr rot="0" spcFirstLastPara="0" vertOverflow="overflow" horzOverflow="overflow" vert="horz" wrap="square" lIns="91440" tIns="45720" rIns="91440" bIns="45720" numCol="1" spcCol="0" rtlCol="0" fromWordArt="0" anchor="ctr" anchorCtr="0" forceAA="0" compatLnSpc="1">
+            <a:prstTxWarp prst="textNoShape">
+              <a:avLst/>
+            </a:prstTxWarp>
+            <a:noAutofit/>
+          </a:bodyPr>
+          <a:lstStyle/>
+          <a:p>
+            <a:pPr algn="ctr"/>
+            <a:endParaRPr lang="en-US"/>
+          </a:p>
+        </p:txBody>
+      </p:sp>
+      <p:sp>
+        <p:nvSpPr>
+          <p:cNvPr id="7" name="Freeform: Shape 6">
+            <a:extLst>
+              <a:ext uri="{FF2B5EF4-FFF2-40B4-BE49-F238E27FC236}">
+                <a16:creationId xmlns:a16="http://schemas.microsoft.com/office/drawing/2014/main" id="{09244632-D161-4A86-A122-A07A181762E1}"/>
+              </a:ext>
+            </a:extLst>
+          </p:cNvPr>
+          <p:cNvSpPr/>
+          <p:nvPr/>
+        </p:nvSpPr>
+        <p:spPr>
+          <a:xfrm>
+            <a:off x="393325" y="1934169"/>
+            <a:ext cx="594966" cy="513467"/>
+          </a:xfrm>
+          <a:custGeom>
+            <a:avLst/>
+            <a:gdLst>
+              <a:gd name="connsiteX0" fmla="*/ 22311 w 594966"/>
+              <a:gd name="connsiteY0" fmla="*/ 513467 h 513467"/>
+              <a:gd name="connsiteX1" fmla="*/ 68493 w 594966"/>
+              <a:gd name="connsiteY1" fmla="*/ 42413 h 513467"/>
+              <a:gd name="connsiteX2" fmla="*/ 594966 w 594966"/>
+              <a:gd name="connsiteY2" fmla="*/ 51649 h 513467"/>
+            </a:gdLst>
+            <a:ahLst/>
+            <a:cxnLst>
+              <a:cxn ang="0">
+                <a:pos x="connsiteX0" y="connsiteY0"/>
+              </a:cxn>
+              <a:cxn ang="0">
+                <a:pos x="connsiteX1" y="connsiteY1"/>
+              </a:cxn>
+              <a:cxn ang="0">
+                <a:pos x="connsiteX2" y="connsiteY2"/>
+              </a:cxn>
+            </a:cxnLst>
+            <a:rect l="l" t="t" r="r" b="b"/>
+            <a:pathLst>
+              <a:path w="594966" h="513467">
+                <a:moveTo>
+                  <a:pt x="22311" y="513467"/>
+                </a:moveTo>
+                <a:cubicBezTo>
+                  <a:pt x="-2320" y="316425"/>
+                  <a:pt x="-26950" y="119383"/>
+                  <a:pt x="68493" y="42413"/>
+                </a:cubicBezTo>
+                <a:cubicBezTo>
+                  <a:pt x="163936" y="-34557"/>
+                  <a:pt x="379451" y="8546"/>
+                  <a:pt x="594966" y="51649"/>
+                </a:cubicBezTo>
+              </a:path>
+            </a:pathLst>
+          </a:custGeom>
+          <a:noFill/>
+          <a:ln w="38100">
+            <a:solidFill>
+              <a:srgbClr val="EF1B36"/>
+            </a:solidFill>
+            <a:headEnd type="none" w="med" len="med"/>
+            <a:tailEnd type="triangle" w="med" len="med"/>
+          </a:ln>
+        </p:spPr>
+        <p:style>
+          <a:lnRef idx="2">
+            <a:schemeClr val="accent1">
+              <a:shade val="50000"/>
+            </a:schemeClr>
+          </a:lnRef>
+          <a:fillRef idx="1">
+            <a:schemeClr val="accent1"/>
+          </a:fillRef>
+          <a:effectRef idx="0">
+            <a:schemeClr val="accent1"/>
+          </a:effectRef>
+          <a:fontRef idx="minor">
+            <a:schemeClr val="lt1"/>
+          </a:fontRef>
+        </p:style>
+        <p:txBody>
+          <a:bodyPr rtlCol="0" anchor="ctr"/>
+          <a:lstStyle/>
+          <a:p>
+            <a:pPr algn="ctr"/>
+            <a:endParaRPr lang="en-US"/>
+          </a:p>
+        </p:txBody>
+      </p:sp>
+      <p:sp>
+        <p:nvSpPr>
+          <p:cNvPr id="9" name="Rectangle 8">
+            <a:extLst>
+              <a:ext uri="{FF2B5EF4-FFF2-40B4-BE49-F238E27FC236}">
+                <a16:creationId xmlns:a16="http://schemas.microsoft.com/office/drawing/2014/main" id="{47EBC8EF-D7BF-4ECE-8E28-A5020AAB5225}"/>
+              </a:ext>
+            </a:extLst>
+          </p:cNvPr>
+          <p:cNvSpPr/>
+          <p:nvPr/>
+        </p:nvSpPr>
+        <p:spPr>
+          <a:xfrm>
+            <a:off x="3910632" y="1777893"/>
+            <a:ext cx="1501340" cy="270020"/>
+          </a:xfrm>
+          <a:prstGeom prst="rect">
+            <a:avLst/>
+          </a:prstGeom>
+          <a:noFill/>
+          <a:ln w="38100">
+            <a:solidFill>
+              <a:srgbClr val="EF1B36"/>
+            </a:solidFill>
+            <a:headEnd type="none" w="med" len="med"/>
+            <a:tailEnd type="triangle" w="med" len="med"/>
+          </a:ln>
+        </p:spPr>
+        <p:style>
+          <a:lnRef idx="2">
+            <a:schemeClr val="accent1">
+              <a:shade val="50000"/>
+            </a:schemeClr>
+          </a:lnRef>
+          <a:fillRef idx="1">
+            <a:schemeClr val="accent1"/>
+          </a:fillRef>
+          <a:effectRef idx="0">
+            <a:schemeClr val="accent1"/>
+          </a:effectRef>
+          <a:fontRef idx="minor">
+            <a:schemeClr val="lt1"/>
+          </a:fontRef>
+        </p:style>
+        <p:txBody>
+          <a:bodyPr rot="0" spcFirstLastPara="0" vertOverflow="overflow" horzOverflow="overflow" vert="horz" wrap="square" lIns="91440" tIns="45720" rIns="91440" bIns="45720" numCol="1" spcCol="0" rtlCol="0" fromWordArt="0" anchor="ctr" anchorCtr="0" forceAA="0" compatLnSpc="1">
+            <a:prstTxWarp prst="textNoShape">
+              <a:avLst/>
+            </a:prstTxWarp>
+            <a:noAutofit/>
+          </a:bodyPr>
+          <a:lstStyle/>
+          <a:p>
+            <a:pPr algn="ctr"/>
+            <a:endParaRPr lang="en-US"/>
+          </a:p>
+        </p:txBody>
+      </p:sp>
+    </p:spTree>
+    <p:extLst>
+      <p:ext uri="{BB962C8B-B14F-4D97-AF65-F5344CB8AC3E}">
+        <p14:creationId xmlns:p14="http://schemas.microsoft.com/office/powerpoint/2010/main" val="37488193"/>
       </p:ext>
     </p:extLst>
   </p:cSld>

</xml_diff>

<commit_message>
Obvience module update for analyze-data-power-bi
</commit_message>
<xml_diff>
--- a/learn-bizapps-pr/power-bi/analyze-data-power-bi/media-layered/power-bi-consumer-source.pptx
+++ b/learn-bizapps-pr/power-bi/analyze-data-power-bi/media-layered/power-bi-consumer-source.pptx
@@ -13120,4 +13120,228 @@
     </a:ext>
   </a:extLst>
 </a:theme>
+</file>
+
+<file path=customXml/item1.xml><?xml version="1.0" encoding="utf-8"?>
+<ct:contentTypeSchema xmlns:ct="http://schemas.microsoft.com/office/2006/metadata/contentType" xmlns:ma="http://schemas.microsoft.com/office/2006/metadata/properties/metaAttributes" ct:_="" ma:_="" ma:contentTypeName="Document" ma:contentTypeID="0x010100E3FD940EE2838B45AB993ADA34E4783D" ma:contentTypeVersion="9" ma:contentTypeDescription="Create a new document." ma:contentTypeScope="" ma:versionID="fb4c92668b331ef2be652c655b024a28">
+  <xsd:schema xmlns:xsd="http://www.w3.org/2001/XMLSchema" xmlns:xs="http://www.w3.org/2001/XMLSchema" xmlns:p="http://schemas.microsoft.com/office/2006/metadata/properties" xmlns:ns2="08b54382-c677-4449-98d7-b90ff4f4e33a" xmlns:ns3="524f4cd7-fc88-4682-9bfe-01e6e2450dda" targetNamespace="http://schemas.microsoft.com/office/2006/metadata/properties" ma:root="true" ma:fieldsID="dae59fe713e246407929ea41af4359d0" ns2:_="" ns3:_="">
+    <xsd:import namespace="08b54382-c677-4449-98d7-b90ff4f4e33a"/>
+    <xsd:import namespace="524f4cd7-fc88-4682-9bfe-01e6e2450dda"/>
+    <xsd:element name="properties">
+      <xsd:complexType>
+        <xsd:sequence>
+          <xsd:element name="documentManagement">
+            <xsd:complexType>
+              <xsd:all>
+                <xsd:element ref="ns2:MediaServiceMetadata" minOccurs="0"/>
+                <xsd:element ref="ns2:MediaServiceFastMetadata" minOccurs="0"/>
+                <xsd:element ref="ns2:MediaServiceAutoTags" minOccurs="0"/>
+                <xsd:element ref="ns2:MediaServiceOCR" minOccurs="0"/>
+                <xsd:element ref="ns2:MediaServiceGenerationTime" minOccurs="0"/>
+                <xsd:element ref="ns2:MediaServiceEventHashCode" minOccurs="0"/>
+                <xsd:element ref="ns2:MediaServiceDateTaken" minOccurs="0"/>
+                <xsd:element ref="ns3:SharedWithUsers" minOccurs="0"/>
+                <xsd:element ref="ns3:SharedWithDetails" minOccurs="0"/>
+              </xsd:all>
+            </xsd:complexType>
+          </xsd:element>
+        </xsd:sequence>
+      </xsd:complexType>
+    </xsd:element>
+  </xsd:schema>
+  <xsd:schema xmlns:xsd="http://www.w3.org/2001/XMLSchema" xmlns:xs="http://www.w3.org/2001/XMLSchema" xmlns:dms="http://schemas.microsoft.com/office/2006/documentManagement/types" xmlns:pc="http://schemas.microsoft.com/office/infopath/2007/PartnerControls" targetNamespace="08b54382-c677-4449-98d7-b90ff4f4e33a" elementFormDefault="qualified">
+    <xsd:import namespace="http://schemas.microsoft.com/office/2006/documentManagement/types"/>
+    <xsd:import namespace="http://schemas.microsoft.com/office/infopath/2007/PartnerControls"/>
+    <xsd:element name="MediaServiceMetadata" ma:index="8" nillable="true" ma:displayName="MediaServiceMetadata" ma:hidden="true" ma:internalName="MediaServiceMetadata" ma:readOnly="true">
+      <xsd:simpleType>
+        <xsd:restriction base="dms:Note"/>
+      </xsd:simpleType>
+    </xsd:element>
+    <xsd:element name="MediaServiceFastMetadata" ma:index="9" nillable="true" ma:displayName="MediaServiceFastMetadata" ma:hidden="true" ma:internalName="MediaServiceFastMetadata" ma:readOnly="true">
+      <xsd:simpleType>
+        <xsd:restriction base="dms:Note"/>
+      </xsd:simpleType>
+    </xsd:element>
+    <xsd:element name="MediaServiceAutoTags" ma:index="10" nillable="true" ma:displayName="Tags" ma:internalName="MediaServiceAutoTags" ma:readOnly="true">
+      <xsd:simpleType>
+        <xsd:restriction base="dms:Text"/>
+      </xsd:simpleType>
+    </xsd:element>
+    <xsd:element name="MediaServiceOCR" ma:index="11" nillable="true" ma:displayName="Extracted Text" ma:internalName="MediaServiceOCR" ma:readOnly="true">
+      <xsd:simpleType>
+        <xsd:restriction base="dms:Note">
+          <xsd:maxLength value="255"/>
+        </xsd:restriction>
+      </xsd:simpleType>
+    </xsd:element>
+    <xsd:element name="MediaServiceGenerationTime" ma:index="12" nillable="true" ma:displayName="MediaServiceGenerationTime" ma:hidden="true" ma:internalName="MediaServiceGenerationTime" ma:readOnly="true">
+      <xsd:simpleType>
+        <xsd:restriction base="dms:Text"/>
+      </xsd:simpleType>
+    </xsd:element>
+    <xsd:element name="MediaServiceEventHashCode" ma:index="13" nillable="true" ma:displayName="MediaServiceEventHashCode" ma:hidden="true" ma:internalName="MediaServiceEventHashCode" ma:readOnly="true">
+      <xsd:simpleType>
+        <xsd:restriction base="dms:Text"/>
+      </xsd:simpleType>
+    </xsd:element>
+    <xsd:element name="MediaServiceDateTaken" ma:index="14" nillable="true" ma:displayName="MediaServiceDateTaken" ma:hidden="true" ma:internalName="MediaServiceDateTaken" ma:readOnly="true">
+      <xsd:simpleType>
+        <xsd:restriction base="dms:Text"/>
+      </xsd:simpleType>
+    </xsd:element>
+  </xsd:schema>
+  <xsd:schema xmlns:xsd="http://www.w3.org/2001/XMLSchema" xmlns:xs="http://www.w3.org/2001/XMLSchema" xmlns:dms="http://schemas.microsoft.com/office/2006/documentManagement/types" xmlns:pc="http://schemas.microsoft.com/office/infopath/2007/PartnerControls" targetNamespace="524f4cd7-fc88-4682-9bfe-01e6e2450dda" elementFormDefault="qualified">
+    <xsd:import namespace="http://schemas.microsoft.com/office/2006/documentManagement/types"/>
+    <xsd:import namespace="http://schemas.microsoft.com/office/infopath/2007/PartnerControls"/>
+    <xsd:element name="SharedWithUsers" ma:index="15" nillable="true" ma:displayName="Shared With" ma:internalName="SharedWithUsers" ma:readOnly="true">
+      <xsd:complexType>
+        <xsd:complexContent>
+          <xsd:extension base="dms:UserMulti">
+            <xsd:sequence>
+              <xsd:element name="UserInfo" minOccurs="0" maxOccurs="unbounded">
+                <xsd:complexType>
+                  <xsd:sequence>
+                    <xsd:element name="DisplayName" type="xsd:string" minOccurs="0"/>
+                    <xsd:element name="AccountId" type="dms:UserId" minOccurs="0" nillable="true"/>
+                    <xsd:element name="AccountType" type="xsd:string" minOccurs="0"/>
+                  </xsd:sequence>
+                </xsd:complexType>
+              </xsd:element>
+            </xsd:sequence>
+          </xsd:extension>
+        </xsd:complexContent>
+      </xsd:complexType>
+    </xsd:element>
+    <xsd:element name="SharedWithDetails" ma:index="16" nillable="true" ma:displayName="Shared With Details" ma:internalName="SharedWithDetails" ma:readOnly="true">
+      <xsd:simpleType>
+        <xsd:restriction base="dms:Note">
+          <xsd:maxLength value="255"/>
+        </xsd:restriction>
+      </xsd:simpleType>
+    </xsd:element>
+  </xsd:schema>
+  <xsd:schema xmlns="http://schemas.openxmlformats.org/package/2006/metadata/core-properties" xmlns:xsd="http://www.w3.org/2001/XMLSchema" xmlns:xsi="http://www.w3.org/2001/XMLSchema-instance" xmlns:dc="http://purl.org/dc/elements/1.1/" xmlns:dcterms="http://purl.org/dc/terms/" xmlns:odoc="http://schemas.microsoft.com/internal/obd" targetNamespace="http://schemas.openxmlformats.org/package/2006/metadata/core-properties" elementFormDefault="qualified" attributeFormDefault="unqualified" blockDefault="#all">
+    <xsd:import namespace="http://purl.org/dc/elements/1.1/" schemaLocation="http://dublincore.org/schemas/xmls/qdc/2003/04/02/dc.xsd"/>
+    <xsd:import namespace="http://purl.org/dc/terms/" schemaLocation="http://dublincore.org/schemas/xmls/qdc/2003/04/02/dcterms.xsd"/>
+    <xsd:element name="coreProperties" type="CT_coreProperties"/>
+    <xsd:complexType name="CT_coreProperties">
+      <xsd:all>
+        <xsd:element ref="dc:creator" minOccurs="0" maxOccurs="1"/>
+        <xsd:element ref="dcterms:created" minOccurs="0" maxOccurs="1"/>
+        <xsd:element ref="dc:identifier" minOccurs="0" maxOccurs="1"/>
+        <xsd:element name="contentType" minOccurs="0" maxOccurs="1" type="xsd:string" ma:index="0" ma:displayName="Content Type"/>
+        <xsd:element ref="dc:title" minOccurs="0" maxOccurs="1" ma:index="4" ma:displayName="Title"/>
+        <xsd:element ref="dc:subject" minOccurs="0" maxOccurs="1"/>
+        <xsd:element ref="dc:description" minOccurs="0" maxOccurs="1"/>
+        <xsd:element name="keywords" minOccurs="0" maxOccurs="1" type="xsd:string"/>
+        <xsd:element ref="dc:language" minOccurs="0" maxOccurs="1"/>
+        <xsd:element name="category" minOccurs="0" maxOccurs="1" type="xsd:string"/>
+        <xsd:element name="version" minOccurs="0" maxOccurs="1" type="xsd:string"/>
+        <xsd:element name="revision" minOccurs="0" maxOccurs="1" type="xsd:string">
+          <xsd:annotation>
+            <xsd:documentation>
+                        This value indicates the number of saves or revisions. The application is responsible for updating this value after each revision.
+                    </xsd:documentation>
+          </xsd:annotation>
+        </xsd:element>
+        <xsd:element name="lastModifiedBy" minOccurs="0" maxOccurs="1" type="xsd:string"/>
+        <xsd:element ref="dcterms:modified" minOccurs="0" maxOccurs="1"/>
+        <xsd:element name="contentStatus" minOccurs="0" maxOccurs="1" type="xsd:string"/>
+      </xsd:all>
+    </xsd:complexType>
+  </xsd:schema>
+  <xs:schema xmlns:pc="http://schemas.microsoft.com/office/infopath/2007/PartnerControls" xmlns:xs="http://www.w3.org/2001/XMLSchema" targetNamespace="http://schemas.microsoft.com/office/infopath/2007/PartnerControls" elementFormDefault="qualified" attributeFormDefault="unqualified">
+    <xs:element name="Person">
+      <xs:complexType>
+        <xs:sequence>
+          <xs:element ref="pc:DisplayName" minOccurs="0"/>
+          <xs:element ref="pc:AccountId" minOccurs="0"/>
+          <xs:element ref="pc:AccountType" minOccurs="0"/>
+        </xs:sequence>
+      </xs:complexType>
+    </xs:element>
+    <xs:element name="DisplayName" type="xs:string"/>
+    <xs:element name="AccountId" type="xs:string"/>
+    <xs:element name="AccountType" type="xs:string"/>
+    <xs:element name="BDCAssociatedEntity">
+      <xs:complexType>
+        <xs:sequence>
+          <xs:element ref="pc:BDCEntity" minOccurs="0" maxOccurs="unbounded"/>
+        </xs:sequence>
+        <xs:attribute ref="pc:EntityNamespace"/>
+        <xs:attribute ref="pc:EntityName"/>
+        <xs:attribute ref="pc:SystemInstanceName"/>
+        <xs:attribute ref="pc:AssociationName"/>
+      </xs:complexType>
+    </xs:element>
+    <xs:attribute name="EntityNamespace" type="xs:string"/>
+    <xs:attribute name="EntityName" type="xs:string"/>
+    <xs:attribute name="SystemInstanceName" type="xs:string"/>
+    <xs:attribute name="AssociationName" type="xs:string"/>
+    <xs:element name="BDCEntity">
+      <xs:complexType>
+        <xs:sequence>
+          <xs:element ref="pc:EntityDisplayName" minOccurs="0"/>
+          <xs:element ref="pc:EntityInstanceReference" minOccurs="0"/>
+          <xs:element ref="pc:EntityId1" minOccurs="0"/>
+          <xs:element ref="pc:EntityId2" minOccurs="0"/>
+          <xs:element ref="pc:EntityId3" minOccurs="0"/>
+          <xs:element ref="pc:EntityId4" minOccurs="0"/>
+          <xs:element ref="pc:EntityId5" minOccurs="0"/>
+        </xs:sequence>
+      </xs:complexType>
+    </xs:element>
+    <xs:element name="EntityDisplayName" type="xs:string"/>
+    <xs:element name="EntityInstanceReference" type="xs:string"/>
+    <xs:element name="EntityId1" type="xs:string"/>
+    <xs:element name="EntityId2" type="xs:string"/>
+    <xs:element name="EntityId3" type="xs:string"/>
+    <xs:element name="EntityId4" type="xs:string"/>
+    <xs:element name="EntityId5" type="xs:string"/>
+    <xs:element name="Terms">
+      <xs:complexType>
+        <xs:sequence>
+          <xs:element ref="pc:TermInfo" minOccurs="0" maxOccurs="unbounded"/>
+        </xs:sequence>
+      </xs:complexType>
+    </xs:element>
+    <xs:element name="TermInfo">
+      <xs:complexType>
+        <xs:sequence>
+          <xs:element ref="pc:TermName" minOccurs="0"/>
+          <xs:element ref="pc:TermId" minOccurs="0"/>
+        </xs:sequence>
+      </xs:complexType>
+    </xs:element>
+    <xs:element name="TermName" type="xs:string"/>
+    <xs:element name="TermId" type="xs:string"/>
+  </xs:schema>
+</ct:contentTypeSchema>
+</file>
+
+<file path=customXml/item2.xml><?xml version="1.0" encoding="utf-8"?>
+<?mso-contentType ?>
+<FormTemplates xmlns="http://schemas.microsoft.com/sharepoint/v3/contenttype/forms">
+  <Display>DocumentLibraryForm</Display>
+  <Edit>DocumentLibraryForm</Edit>
+  <New>DocumentLibraryForm</New>
+</FormTemplates>
+</file>
+
+<file path=customXml/item3.xml><?xml version="1.0" encoding="utf-8"?>
+<p:properties xmlns:p="http://schemas.microsoft.com/office/2006/metadata/properties" xmlns:xsi="http://www.w3.org/2001/XMLSchema-instance" xmlns:pc="http://schemas.microsoft.com/office/infopath/2007/PartnerControls">
+  <documentManagement/>
+</p:properties>
+</file>
+
+<file path=customXml/itemProps1.xml><?xml version="1.0" encoding="utf-8"?>
+<ds:datastoreItem xmlns:ds="http://schemas.openxmlformats.org/officeDocument/2006/customXml" ds:itemID="{DB7A6743-B232-40B0-AB82-5C574C8DAE5F}"/>
+</file>
+
+<file path=customXml/itemProps2.xml><?xml version="1.0" encoding="utf-8"?>
+<ds:datastoreItem xmlns:ds="http://schemas.openxmlformats.org/officeDocument/2006/customXml" ds:itemID="{CA8F6909-5D98-46AB-828C-D5FA8CD20639}"/>
+</file>
+
+<file path=customXml/itemProps3.xml><?xml version="1.0" encoding="utf-8"?>
+<ds:datastoreItem xmlns:ds="http://schemas.openxmlformats.org/officeDocument/2006/customXml" ds:itemID="{28CAFC9F-07E1-49FD-808D-1A160AF13A6F}"/>
 </file>
</xml_diff>